<commit_message>
Code clean up, documentation and refinement for structure
</commit_message>
<xml_diff>
--- a/QuantitativeResearchTradingProcess.pptx
+++ b/QuantitativeResearchTradingProcess.pptx
@@ -9,6 +9,7 @@
     <p:sldId id="257" r:id="rId3"/>
     <p:sldId id="259" r:id="rId4"/>
     <p:sldId id="258" r:id="rId5"/>
+    <p:sldId id="260" r:id="rId6"/>
   </p:sldIdLst>
   <p:sldSz cx="12192000" cy="6858000"/>
   <p:notesSz cx="6858000" cy="9144000"/>
@@ -107,6 +108,11 @@
       </a:defRPr>
     </a:lvl9pPr>
   </p:defaultTextStyle>
+  <p:extLst>
+    <p:ext uri="{EFAFB233-063F-42B5-8137-9DF3F51BA10A}">
+      <p15:sldGuideLst xmlns:p15="http://schemas.microsoft.com/office/powerpoint/2012/main"/>
+    </p:ext>
+  </p:extLst>
 </p:presentation>
 </file>
 
@@ -257,7 +263,7 @@
           <a:p>
             <a:fld id="{63D5CEF2-9A0A-C64B-8406-77F6370A395F}" type="datetimeFigureOut">
               <a:rPr lang="de-DE" smtClean="0"/>
-              <a:t>26.12.23</a:t>
+              <a:t>21.03.24</a:t>
             </a:fld>
             <a:endParaRPr lang="de-DE"/>
           </a:p>
@@ -455,7 +461,7 @@
           <a:p>
             <a:fld id="{63D5CEF2-9A0A-C64B-8406-77F6370A395F}" type="datetimeFigureOut">
               <a:rPr lang="de-DE" smtClean="0"/>
-              <a:t>26.12.23</a:t>
+              <a:t>21.03.24</a:t>
             </a:fld>
             <a:endParaRPr lang="de-DE"/>
           </a:p>
@@ -663,7 +669,7 @@
           <a:p>
             <a:fld id="{63D5CEF2-9A0A-C64B-8406-77F6370A395F}" type="datetimeFigureOut">
               <a:rPr lang="de-DE" smtClean="0"/>
-              <a:t>26.12.23</a:t>
+              <a:t>21.03.24</a:t>
             </a:fld>
             <a:endParaRPr lang="de-DE"/>
           </a:p>
@@ -861,7 +867,7 @@
           <a:p>
             <a:fld id="{63D5CEF2-9A0A-C64B-8406-77F6370A395F}" type="datetimeFigureOut">
               <a:rPr lang="de-DE" smtClean="0"/>
-              <a:t>26.12.23</a:t>
+              <a:t>21.03.24</a:t>
             </a:fld>
             <a:endParaRPr lang="de-DE"/>
           </a:p>
@@ -1136,7 +1142,7 @@
           <a:p>
             <a:fld id="{63D5CEF2-9A0A-C64B-8406-77F6370A395F}" type="datetimeFigureOut">
               <a:rPr lang="de-DE" smtClean="0"/>
-              <a:t>26.12.23</a:t>
+              <a:t>21.03.24</a:t>
             </a:fld>
             <a:endParaRPr lang="de-DE"/>
           </a:p>
@@ -1401,7 +1407,7 @@
           <a:p>
             <a:fld id="{63D5CEF2-9A0A-C64B-8406-77F6370A395F}" type="datetimeFigureOut">
               <a:rPr lang="de-DE" smtClean="0"/>
-              <a:t>26.12.23</a:t>
+              <a:t>21.03.24</a:t>
             </a:fld>
             <a:endParaRPr lang="de-DE"/>
           </a:p>
@@ -1813,7 +1819,7 @@
           <a:p>
             <a:fld id="{63D5CEF2-9A0A-C64B-8406-77F6370A395F}" type="datetimeFigureOut">
               <a:rPr lang="de-DE" smtClean="0"/>
-              <a:t>26.12.23</a:t>
+              <a:t>21.03.24</a:t>
             </a:fld>
             <a:endParaRPr lang="de-DE"/>
           </a:p>
@@ -1954,7 +1960,7 @@
           <a:p>
             <a:fld id="{63D5CEF2-9A0A-C64B-8406-77F6370A395F}" type="datetimeFigureOut">
               <a:rPr lang="de-DE" smtClean="0"/>
-              <a:t>26.12.23</a:t>
+              <a:t>21.03.24</a:t>
             </a:fld>
             <a:endParaRPr lang="de-DE"/>
           </a:p>
@@ -2067,7 +2073,7 @@
           <a:p>
             <a:fld id="{63D5CEF2-9A0A-C64B-8406-77F6370A395F}" type="datetimeFigureOut">
               <a:rPr lang="de-DE" smtClean="0"/>
-              <a:t>26.12.23</a:t>
+              <a:t>21.03.24</a:t>
             </a:fld>
             <a:endParaRPr lang="de-DE"/>
           </a:p>
@@ -2378,7 +2384,7 @@
           <a:p>
             <a:fld id="{63D5CEF2-9A0A-C64B-8406-77F6370A395F}" type="datetimeFigureOut">
               <a:rPr lang="de-DE" smtClean="0"/>
-              <a:t>26.12.23</a:t>
+              <a:t>21.03.24</a:t>
             </a:fld>
             <a:endParaRPr lang="de-DE"/>
           </a:p>
@@ -2666,7 +2672,7 @@
           <a:p>
             <a:fld id="{63D5CEF2-9A0A-C64B-8406-77F6370A395F}" type="datetimeFigureOut">
               <a:rPr lang="de-DE" smtClean="0"/>
-              <a:t>26.12.23</a:t>
+              <a:t>21.03.24</a:t>
             </a:fld>
             <a:endParaRPr lang="de-DE"/>
           </a:p>
@@ -2907,7 +2913,7 @@
           <a:p>
             <a:fld id="{63D5CEF2-9A0A-C64B-8406-77F6370A395F}" type="datetimeFigureOut">
               <a:rPr lang="de-DE" smtClean="0"/>
-              <a:t>26.12.23</a:t>
+              <a:t>21.03.24</a:t>
             </a:fld>
             <a:endParaRPr lang="de-DE"/>
           </a:p>
@@ -5353,7 +5359,7 @@
           </a:xfrm>
           <a:prstGeom prst="bentConnector3">
             <a:avLst>
-              <a:gd name="adj1" fmla="val -1218401"/>
+              <a:gd name="adj1" fmla="val -838069"/>
             </a:avLst>
           </a:prstGeom>
           <a:ln>
@@ -5438,7 +5444,7 @@
         <p:spPr>
           <a:xfrm>
             <a:off x="4405678" y="5866000"/>
-            <a:ext cx="2181263" cy="938719"/>
+            <a:ext cx="2181263" cy="1107996"/>
           </a:xfrm>
           <a:prstGeom prst="rect">
             <a:avLst/>
@@ -5479,6 +5485,16 @@
               <a:t>Formatting</a:t>
             </a:r>
             <a:endParaRPr lang="de-DE" sz="1100" dirty="0"/>
+          </a:p>
+          <a:p>
+            <a:pPr marL="180975" indent="-180975">
+              <a:buFont typeface="Arial" panose="020B0604020202020204" pitchFamily="34" charset="0"/>
+              <a:buChar char="•"/>
+            </a:pPr>
+            <a:r>
+              <a:rPr lang="de-DE" sz="1100" dirty="0"/>
+              <a:t>Data Encoding</a:t>
+            </a:r>
           </a:p>
           <a:p>
             <a:pPr marL="180975" indent="-180975">
@@ -6695,6 +6711,677 @@
           <a:xfrm>
             <a:off x="6530343" y="1691592"/>
             <a:ext cx="425257" cy="0"/>
+          </a:xfrm>
+          <a:prstGeom prst="straightConnector1">
+            <a:avLst/>
+          </a:prstGeom>
+          <a:ln>
+            <a:tailEnd type="triangle"/>
+          </a:ln>
+        </p:spPr>
+        <p:style>
+          <a:lnRef idx="1">
+            <a:schemeClr val="dk1"/>
+          </a:lnRef>
+          <a:fillRef idx="0">
+            <a:schemeClr val="dk1"/>
+          </a:fillRef>
+          <a:effectRef idx="0">
+            <a:schemeClr val="dk1"/>
+          </a:effectRef>
+          <a:fontRef idx="minor">
+            <a:schemeClr val="tx1"/>
+          </a:fontRef>
+        </p:style>
+      </p:cxnSp>
+      <p:sp>
+        <p:nvSpPr>
+          <p:cNvPr id="2" name="Textfeld 1">
+            <a:extLst>
+              <a:ext uri="{FF2B5EF4-FFF2-40B4-BE49-F238E27FC236}">
+                <a16:creationId xmlns:a16="http://schemas.microsoft.com/office/drawing/2014/main" id="{EEA64D57-8268-DDFD-E0C6-33D4B957E5EA}"/>
+              </a:ext>
+            </a:extLst>
+          </p:cNvPr>
+          <p:cNvSpPr txBox="1"/>
+          <p:nvPr/>
+        </p:nvSpPr>
+        <p:spPr>
+          <a:xfrm>
+            <a:off x="9933269" y="1015969"/>
+            <a:ext cx="1561558" cy="261610"/>
+          </a:xfrm>
+          <a:prstGeom prst="rect">
+            <a:avLst/>
+          </a:prstGeom>
+          <a:noFill/>
+        </p:spPr>
+        <p:txBody>
+          <a:bodyPr wrap="square" rtlCol="0">
+            <a:spAutoFit/>
+          </a:bodyPr>
+          <a:lstStyle/>
+          <a:p>
+            <a:pPr algn="ctr"/>
+            <a:r>
+              <a:rPr lang="de-DE" sz="1100" u="sng" dirty="0"/>
+              <a:t>Database </a:t>
+            </a:r>
+            <a:r>
+              <a:rPr lang="de-DE" sz="1100" u="sng" dirty="0" err="1"/>
+              <a:t>infrastructure</a:t>
+            </a:r>
+            <a:endParaRPr lang="de-DE" sz="1100" u="sng" dirty="0"/>
+          </a:p>
+        </p:txBody>
+      </p:sp>
+      <p:sp>
+        <p:nvSpPr>
+          <p:cNvPr id="3" name="Textfeld 2">
+            <a:extLst>
+              <a:ext uri="{FF2B5EF4-FFF2-40B4-BE49-F238E27FC236}">
+                <a16:creationId xmlns:a16="http://schemas.microsoft.com/office/drawing/2014/main" id="{40172B33-99DC-0E2F-44FA-04FF441E78B5}"/>
+              </a:ext>
+            </a:extLst>
+          </p:cNvPr>
+          <p:cNvSpPr txBox="1"/>
+          <p:nvPr/>
+        </p:nvSpPr>
+        <p:spPr>
+          <a:xfrm>
+            <a:off x="10100376" y="1260828"/>
+            <a:ext cx="1806495" cy="938719"/>
+          </a:xfrm>
+          <a:prstGeom prst="rect">
+            <a:avLst/>
+          </a:prstGeom>
+          <a:noFill/>
+        </p:spPr>
+        <p:txBody>
+          <a:bodyPr wrap="square" rtlCol="0">
+            <a:spAutoFit/>
+          </a:bodyPr>
+          <a:lstStyle/>
+          <a:p>
+            <a:pPr marL="180975" indent="-180975">
+              <a:buFont typeface="Arial" panose="020B0604020202020204" pitchFamily="34" charset="0"/>
+              <a:buChar char="•"/>
+            </a:pPr>
+            <a:r>
+              <a:rPr lang="de-DE" sz="1100" dirty="0"/>
+              <a:t>SQL </a:t>
+            </a:r>
+            <a:r>
+              <a:rPr lang="de-DE" sz="1100" dirty="0" err="1"/>
+              <a:t>variants</a:t>
+            </a:r>
+            <a:endParaRPr lang="de-DE" sz="1100" dirty="0"/>
+          </a:p>
+          <a:p>
+            <a:pPr marL="638175" lvl="1" indent="-180975">
+              <a:buFont typeface="Arial" panose="020B0604020202020204" pitchFamily="34" charset="0"/>
+              <a:buChar char="•"/>
+            </a:pPr>
+            <a:r>
+              <a:rPr lang="de-DE" sz="1100" dirty="0"/>
+              <a:t>MySQL</a:t>
+            </a:r>
+          </a:p>
+          <a:p>
+            <a:pPr marL="638175" lvl="1" indent="-180975">
+              <a:buFont typeface="Arial" panose="020B0604020202020204" pitchFamily="34" charset="0"/>
+              <a:buChar char="•"/>
+            </a:pPr>
+            <a:r>
+              <a:rPr lang="de-DE" sz="1100" dirty="0" err="1"/>
+              <a:t>PostGres</a:t>
+            </a:r>
+            <a:endParaRPr lang="de-DE" sz="1100" dirty="0"/>
+          </a:p>
+          <a:p>
+            <a:pPr marL="180975" indent="-180975">
+              <a:buFont typeface="Arial" panose="020B0604020202020204" pitchFamily="34" charset="0"/>
+              <a:buChar char="•"/>
+            </a:pPr>
+            <a:r>
+              <a:rPr lang="de-DE" sz="1100" dirty="0"/>
+              <a:t>Kafka (high </a:t>
+            </a:r>
+            <a:r>
+              <a:rPr lang="de-DE" sz="1100" dirty="0" err="1"/>
+              <a:t>frequency</a:t>
+            </a:r>
+            <a:r>
+              <a:rPr lang="de-DE" sz="1100" dirty="0"/>
+              <a:t>)</a:t>
+            </a:r>
+          </a:p>
+          <a:p>
+            <a:pPr marL="180975" indent="-180975">
+              <a:buFont typeface="Arial" panose="020B0604020202020204" pitchFamily="34" charset="0"/>
+              <a:buChar char="•"/>
+            </a:pPr>
+            <a:r>
+              <a:rPr lang="de-DE" sz="1100" dirty="0"/>
+              <a:t>MS Azure Cloud Storage</a:t>
+            </a:r>
+          </a:p>
+        </p:txBody>
+      </p:sp>
+      <p:sp>
+        <p:nvSpPr>
+          <p:cNvPr id="10" name="Textfeld 9">
+            <a:extLst>
+              <a:ext uri="{FF2B5EF4-FFF2-40B4-BE49-F238E27FC236}">
+                <a16:creationId xmlns:a16="http://schemas.microsoft.com/office/drawing/2014/main" id="{7D4244F3-8FD0-DE98-6747-2849F9F92888}"/>
+              </a:ext>
+            </a:extLst>
+          </p:cNvPr>
+          <p:cNvSpPr txBox="1"/>
+          <p:nvPr/>
+        </p:nvSpPr>
+        <p:spPr>
+          <a:xfrm>
+            <a:off x="6955600" y="2922360"/>
+            <a:ext cx="536098" cy="261610"/>
+          </a:xfrm>
+          <a:prstGeom prst="rect">
+            <a:avLst/>
+          </a:prstGeom>
+          <a:noFill/>
+        </p:spPr>
+        <p:txBody>
+          <a:bodyPr wrap="square" rtlCol="0">
+            <a:spAutoFit/>
+          </a:bodyPr>
+          <a:lstStyle/>
+          <a:p>
+            <a:pPr marL="180975" indent="-180975">
+              <a:buFont typeface="Arial" panose="020B0604020202020204" pitchFamily="34" charset="0"/>
+              <a:buChar char="•"/>
+            </a:pPr>
+            <a:r>
+              <a:rPr lang="de-DE" sz="1100" dirty="0" err="1"/>
+              <a:t>Git</a:t>
+            </a:r>
+            <a:endParaRPr lang="de-DE" sz="1100" dirty="0"/>
+          </a:p>
+        </p:txBody>
+      </p:sp>
+      <p:cxnSp>
+        <p:nvCxnSpPr>
+          <p:cNvPr id="30" name="Gewinkelte Verbindung 29">
+            <a:extLst>
+              <a:ext uri="{FF2B5EF4-FFF2-40B4-BE49-F238E27FC236}">
+                <a16:creationId xmlns:a16="http://schemas.microsoft.com/office/drawing/2014/main" id="{E54AEB3B-B8D7-AFE5-3725-A5127F5A54E2}"/>
+              </a:ext>
+            </a:extLst>
+          </p:cNvPr>
+          <p:cNvCxnSpPr>
+            <a:cxnSpLocks/>
+            <a:stCxn id="9" idx="2"/>
+            <a:endCxn id="2" idx="1"/>
+          </p:cNvCxnSpPr>
+          <p:nvPr/>
+        </p:nvCxnSpPr>
+        <p:spPr>
+          <a:xfrm rot="16200000" flipH="1">
+            <a:off x="8094642" y="-691853"/>
+            <a:ext cx="102876" cy="3574378"/>
+          </a:xfrm>
+          <a:prstGeom prst="bentConnector2">
+            <a:avLst/>
+          </a:prstGeom>
+          <a:ln>
+            <a:tailEnd type="triangle"/>
+          </a:ln>
+        </p:spPr>
+        <p:style>
+          <a:lnRef idx="1">
+            <a:schemeClr val="dk1"/>
+          </a:lnRef>
+          <a:fillRef idx="0">
+            <a:schemeClr val="dk1"/>
+          </a:fillRef>
+          <a:effectRef idx="0">
+            <a:schemeClr val="dk1"/>
+          </a:effectRef>
+          <a:fontRef idx="minor">
+            <a:schemeClr val="tx1"/>
+          </a:fontRef>
+        </p:style>
+      </p:cxnSp>
+      <p:sp>
+        <p:nvSpPr>
+          <p:cNvPr id="39" name="Geschweifte Klammer rechts 38">
+            <a:extLst>
+              <a:ext uri="{FF2B5EF4-FFF2-40B4-BE49-F238E27FC236}">
+                <a16:creationId xmlns:a16="http://schemas.microsoft.com/office/drawing/2014/main" id="{BDDC861C-D634-8A49-6A32-1DA71CC31FBD}"/>
+              </a:ext>
+            </a:extLst>
+          </p:cNvPr>
+          <p:cNvSpPr/>
+          <p:nvPr/>
+        </p:nvSpPr>
+        <p:spPr>
+          <a:xfrm rot="10800000">
+            <a:off x="3130405" y="2681703"/>
+            <a:ext cx="244449" cy="4099462"/>
+          </a:xfrm>
+          <a:prstGeom prst="rightBrace">
+            <a:avLst/>
+          </a:prstGeom>
+          <a:ln w="19050"/>
+        </p:spPr>
+        <p:style>
+          <a:lnRef idx="1">
+            <a:schemeClr val="dk1"/>
+          </a:lnRef>
+          <a:fillRef idx="0">
+            <a:schemeClr val="dk1"/>
+          </a:fillRef>
+          <a:effectRef idx="0">
+            <a:schemeClr val="dk1"/>
+          </a:effectRef>
+          <a:fontRef idx="minor">
+            <a:schemeClr val="tx1"/>
+          </a:fontRef>
+        </p:style>
+        <p:txBody>
+          <a:bodyPr rtlCol="0" anchor="ctr"/>
+          <a:lstStyle/>
+          <a:p>
+            <a:pPr algn="ctr"/>
+            <a:endParaRPr lang="de-DE" sz="1100"/>
+          </a:p>
+        </p:txBody>
+      </p:sp>
+      <p:sp>
+        <p:nvSpPr>
+          <p:cNvPr id="40" name="Textfeld 39">
+            <a:extLst>
+              <a:ext uri="{FF2B5EF4-FFF2-40B4-BE49-F238E27FC236}">
+                <a16:creationId xmlns:a16="http://schemas.microsoft.com/office/drawing/2014/main" id="{6F04A38C-7D20-B006-7C61-A458B2A44418}"/>
+              </a:ext>
+            </a:extLst>
+          </p:cNvPr>
+          <p:cNvSpPr txBox="1"/>
+          <p:nvPr/>
+        </p:nvSpPr>
+        <p:spPr>
+          <a:xfrm>
+            <a:off x="1760289" y="4186854"/>
+            <a:ext cx="1286865" cy="261610"/>
+          </a:xfrm>
+          <a:prstGeom prst="rect">
+            <a:avLst/>
+          </a:prstGeom>
+          <a:noFill/>
+        </p:spPr>
+        <p:txBody>
+          <a:bodyPr wrap="square" rtlCol="0">
+            <a:spAutoFit/>
+          </a:bodyPr>
+          <a:lstStyle/>
+          <a:p>
+            <a:pPr algn="ctr"/>
+            <a:r>
+              <a:rPr lang="de-DE" sz="1100" u="sng" dirty="0" err="1"/>
+              <a:t>Dev</a:t>
+            </a:r>
+            <a:r>
+              <a:rPr lang="de-DE" sz="1100" u="sng" dirty="0"/>
+              <a:t> Style </a:t>
+            </a:r>
+            <a:r>
+              <a:rPr lang="de-DE" sz="1100" u="sng" dirty="0" err="1"/>
+              <a:t>Concepts</a:t>
+            </a:r>
+            <a:endParaRPr lang="de-DE" sz="1100" u="sng" dirty="0"/>
+          </a:p>
+        </p:txBody>
+      </p:sp>
+      <p:sp>
+        <p:nvSpPr>
+          <p:cNvPr id="41" name="Textfeld 40">
+            <a:extLst>
+              <a:ext uri="{FF2B5EF4-FFF2-40B4-BE49-F238E27FC236}">
+                <a16:creationId xmlns:a16="http://schemas.microsoft.com/office/drawing/2014/main" id="{89CFD564-19C8-2E13-EFBA-A4AEEE0811D5}"/>
+              </a:ext>
+            </a:extLst>
+          </p:cNvPr>
+          <p:cNvSpPr txBox="1"/>
+          <p:nvPr/>
+        </p:nvSpPr>
+        <p:spPr>
+          <a:xfrm>
+            <a:off x="1889384" y="4408128"/>
+            <a:ext cx="966328" cy="430887"/>
+          </a:xfrm>
+          <a:prstGeom prst="rect">
+            <a:avLst/>
+          </a:prstGeom>
+          <a:noFill/>
+        </p:spPr>
+        <p:txBody>
+          <a:bodyPr wrap="square" rtlCol="0">
+            <a:spAutoFit/>
+          </a:bodyPr>
+          <a:lstStyle/>
+          <a:p>
+            <a:pPr marL="180975" indent="-180975">
+              <a:buFont typeface="Arial" panose="020B0604020202020204" pitchFamily="34" charset="0"/>
+              <a:buChar char="•"/>
+            </a:pPr>
+            <a:r>
+              <a:rPr lang="de-DE" sz="1100" dirty="0" err="1"/>
+              <a:t>DevOps</a:t>
+            </a:r>
+            <a:endParaRPr lang="de-DE" sz="1100" dirty="0"/>
+          </a:p>
+          <a:p>
+            <a:pPr marL="180975" indent="-180975">
+              <a:buFont typeface="Arial" panose="020B0604020202020204" pitchFamily="34" charset="0"/>
+              <a:buChar char="•"/>
+            </a:pPr>
+            <a:r>
+              <a:rPr lang="de-DE" sz="1100" dirty="0" err="1"/>
+              <a:t>MLOps</a:t>
+            </a:r>
+            <a:endParaRPr lang="de-DE" sz="1100" dirty="0"/>
+          </a:p>
+        </p:txBody>
+      </p:sp>
+      <p:sp>
+        <p:nvSpPr>
+          <p:cNvPr id="43" name="Textfeld 42">
+            <a:extLst>
+              <a:ext uri="{FF2B5EF4-FFF2-40B4-BE49-F238E27FC236}">
+                <a16:creationId xmlns:a16="http://schemas.microsoft.com/office/drawing/2014/main" id="{4F2BA4B3-A767-C8E2-9CEB-A8ABD653FAF6}"/>
+              </a:ext>
+            </a:extLst>
+          </p:cNvPr>
+          <p:cNvSpPr txBox="1"/>
+          <p:nvPr/>
+        </p:nvSpPr>
+        <p:spPr>
+          <a:xfrm>
+            <a:off x="1796542" y="5040026"/>
+            <a:ext cx="1141255" cy="261610"/>
+          </a:xfrm>
+          <a:prstGeom prst="rect">
+            <a:avLst/>
+          </a:prstGeom>
+          <a:noFill/>
+          <a:ln>
+            <a:solidFill>
+              <a:schemeClr val="tx1"/>
+            </a:solidFill>
+          </a:ln>
+        </p:spPr>
+        <p:txBody>
+          <a:bodyPr wrap="square" rtlCol="0">
+            <a:spAutoFit/>
+          </a:bodyPr>
+          <a:lstStyle/>
+          <a:p>
+            <a:pPr algn="ctr"/>
+            <a:r>
+              <a:rPr lang="de-DE" sz="1100" b="1" dirty="0" err="1"/>
+              <a:t>Standardization</a:t>
+            </a:r>
+            <a:endParaRPr lang="de-DE" sz="1100" b="1" dirty="0"/>
+          </a:p>
+        </p:txBody>
+      </p:sp>
+      <p:sp>
+        <p:nvSpPr>
+          <p:cNvPr id="46" name="Pfeil nach unten 45">
+            <a:extLst>
+              <a:ext uri="{FF2B5EF4-FFF2-40B4-BE49-F238E27FC236}">
+                <a16:creationId xmlns:a16="http://schemas.microsoft.com/office/drawing/2014/main" id="{002F20BA-6C6D-A1CE-A3A9-E74B49D7AA01}"/>
+              </a:ext>
+            </a:extLst>
+          </p:cNvPr>
+          <p:cNvSpPr/>
+          <p:nvPr/>
+        </p:nvSpPr>
+        <p:spPr>
+          <a:xfrm>
+            <a:off x="2189105" y="4850409"/>
+            <a:ext cx="348319" cy="145097"/>
+          </a:xfrm>
+          <a:prstGeom prst="downArrow">
+            <a:avLst/>
+          </a:prstGeom>
+          <a:solidFill>
+            <a:schemeClr val="tx1"/>
+          </a:solidFill>
+          <a:ln>
+            <a:solidFill>
+              <a:schemeClr val="tx1"/>
+            </a:solidFill>
+          </a:ln>
+        </p:spPr>
+        <p:style>
+          <a:lnRef idx="2">
+            <a:schemeClr val="accent1">
+              <a:shade val="15000"/>
+            </a:schemeClr>
+          </a:lnRef>
+          <a:fillRef idx="1">
+            <a:schemeClr val="accent1"/>
+          </a:fillRef>
+          <a:effectRef idx="0">
+            <a:schemeClr val="accent1"/>
+          </a:effectRef>
+          <a:fontRef idx="minor">
+            <a:schemeClr val="lt1"/>
+          </a:fontRef>
+        </p:style>
+        <p:txBody>
+          <a:bodyPr rtlCol="0" anchor="ctr"/>
+          <a:lstStyle/>
+          <a:p>
+            <a:pPr algn="ctr"/>
+            <a:endParaRPr lang="de-DE"/>
+          </a:p>
+        </p:txBody>
+      </p:sp>
+      <p:sp>
+        <p:nvSpPr>
+          <p:cNvPr id="47" name="Geschweifte Klammer rechts 46">
+            <a:extLst>
+              <a:ext uri="{FF2B5EF4-FFF2-40B4-BE49-F238E27FC236}">
+                <a16:creationId xmlns:a16="http://schemas.microsoft.com/office/drawing/2014/main" id="{993B7C66-1EBA-8693-290B-D71972941C77}"/>
+              </a:ext>
+            </a:extLst>
+          </p:cNvPr>
+          <p:cNvSpPr/>
+          <p:nvPr/>
+        </p:nvSpPr>
+        <p:spPr>
+          <a:xfrm>
+            <a:off x="6829878" y="5830011"/>
+            <a:ext cx="511628" cy="924732"/>
+          </a:xfrm>
+          <a:prstGeom prst="rightBrace">
+            <a:avLst/>
+          </a:prstGeom>
+          <a:ln w="19050"/>
+        </p:spPr>
+        <p:style>
+          <a:lnRef idx="1">
+            <a:schemeClr val="dk1"/>
+          </a:lnRef>
+          <a:fillRef idx="0">
+            <a:schemeClr val="dk1"/>
+          </a:fillRef>
+          <a:effectRef idx="0">
+            <a:schemeClr val="dk1"/>
+          </a:effectRef>
+          <a:fontRef idx="minor">
+            <a:schemeClr val="tx1"/>
+          </a:fontRef>
+        </p:style>
+        <p:txBody>
+          <a:bodyPr rtlCol="0" anchor="ctr"/>
+          <a:lstStyle/>
+          <a:p>
+            <a:pPr algn="ctr"/>
+            <a:endParaRPr lang="de-DE" sz="1100"/>
+          </a:p>
+        </p:txBody>
+      </p:sp>
+      <p:sp>
+        <p:nvSpPr>
+          <p:cNvPr id="53" name="Textfeld 52">
+            <a:extLst>
+              <a:ext uri="{FF2B5EF4-FFF2-40B4-BE49-F238E27FC236}">
+                <a16:creationId xmlns:a16="http://schemas.microsoft.com/office/drawing/2014/main" id="{5F8EF2B3-1CFA-E84E-32C7-529CF4767378}"/>
+              </a:ext>
+            </a:extLst>
+          </p:cNvPr>
+          <p:cNvSpPr txBox="1"/>
+          <p:nvPr/>
+        </p:nvSpPr>
+        <p:spPr>
+          <a:xfrm>
+            <a:off x="7314969" y="6126888"/>
+            <a:ext cx="1382309" cy="261610"/>
+          </a:xfrm>
+          <a:prstGeom prst="rect">
+            <a:avLst/>
+          </a:prstGeom>
+          <a:noFill/>
+          <a:ln>
+            <a:solidFill>
+              <a:schemeClr val="tx1"/>
+            </a:solidFill>
+          </a:ln>
+        </p:spPr>
+        <p:txBody>
+          <a:bodyPr wrap="square" rtlCol="0">
+            <a:spAutoFit/>
+          </a:bodyPr>
+          <a:lstStyle/>
+          <a:p>
+            <a:pPr algn="ctr"/>
+            <a:r>
+              <a:rPr lang="de-DE" sz="1100" dirty="0"/>
+              <a:t>Feature </a:t>
+            </a:r>
+            <a:r>
+              <a:rPr lang="de-DE" sz="1100" dirty="0" err="1"/>
+              <a:t>Selection</a:t>
+            </a:r>
+            <a:endParaRPr lang="de-DE" sz="1100" dirty="0"/>
+          </a:p>
+        </p:txBody>
+      </p:sp>
+      <p:cxnSp>
+        <p:nvCxnSpPr>
+          <p:cNvPr id="54" name="Gerade Verbindung mit Pfeil 53">
+            <a:extLst>
+              <a:ext uri="{FF2B5EF4-FFF2-40B4-BE49-F238E27FC236}">
+                <a16:creationId xmlns:a16="http://schemas.microsoft.com/office/drawing/2014/main" id="{BFADA703-7C65-2C89-51D1-305FFDD3A72A}"/>
+              </a:ext>
+            </a:extLst>
+          </p:cNvPr>
+          <p:cNvCxnSpPr>
+            <a:cxnSpLocks/>
+            <a:stCxn id="53" idx="3"/>
+            <a:endCxn id="65" idx="1"/>
+          </p:cNvCxnSpPr>
+          <p:nvPr/>
+        </p:nvCxnSpPr>
+        <p:spPr>
+          <a:xfrm>
+            <a:off x="8697278" y="6257693"/>
+            <a:ext cx="1030198" cy="5396"/>
+          </a:xfrm>
+          <a:prstGeom prst="straightConnector1">
+            <a:avLst/>
+          </a:prstGeom>
+          <a:ln>
+            <a:tailEnd type="triangle"/>
+          </a:ln>
+        </p:spPr>
+        <p:style>
+          <a:lnRef idx="1">
+            <a:schemeClr val="dk1"/>
+          </a:lnRef>
+          <a:fillRef idx="0">
+            <a:schemeClr val="dk1"/>
+          </a:fillRef>
+          <a:effectRef idx="0">
+            <a:schemeClr val="dk1"/>
+          </a:effectRef>
+          <a:fontRef idx="minor">
+            <a:schemeClr val="tx1"/>
+          </a:fontRef>
+        </p:style>
+      </p:cxnSp>
+      <p:sp>
+        <p:nvSpPr>
+          <p:cNvPr id="65" name="Textfeld 64">
+            <a:extLst>
+              <a:ext uri="{FF2B5EF4-FFF2-40B4-BE49-F238E27FC236}">
+                <a16:creationId xmlns:a16="http://schemas.microsoft.com/office/drawing/2014/main" id="{30845FB0-8CAC-AF2E-5DDC-B8F21EF00C44}"/>
+              </a:ext>
+            </a:extLst>
+          </p:cNvPr>
+          <p:cNvSpPr txBox="1"/>
+          <p:nvPr/>
+        </p:nvSpPr>
+        <p:spPr>
+          <a:xfrm>
+            <a:off x="9727476" y="6132284"/>
+            <a:ext cx="1382309" cy="261610"/>
+          </a:xfrm>
+          <a:prstGeom prst="rect">
+            <a:avLst/>
+          </a:prstGeom>
+          <a:noFill/>
+          <a:ln>
+            <a:solidFill>
+              <a:schemeClr val="tx1"/>
+            </a:solidFill>
+          </a:ln>
+        </p:spPr>
+        <p:txBody>
+          <a:bodyPr wrap="square" rtlCol="0">
+            <a:spAutoFit/>
+          </a:bodyPr>
+          <a:lstStyle/>
+          <a:p>
+            <a:pPr algn="ctr"/>
+            <a:r>
+              <a:rPr lang="de-DE" sz="1100" dirty="0"/>
+              <a:t>Feature Stores</a:t>
+            </a:r>
+          </a:p>
+        </p:txBody>
+      </p:sp>
+      <p:cxnSp>
+        <p:nvCxnSpPr>
+          <p:cNvPr id="71" name="Gerade Verbindung mit Pfeil 70">
+            <a:extLst>
+              <a:ext uri="{FF2B5EF4-FFF2-40B4-BE49-F238E27FC236}">
+                <a16:creationId xmlns:a16="http://schemas.microsoft.com/office/drawing/2014/main" id="{17E6F397-B9C2-209B-5783-575510318342}"/>
+              </a:ext>
+            </a:extLst>
+          </p:cNvPr>
+          <p:cNvCxnSpPr>
+            <a:cxnSpLocks/>
+            <a:stCxn id="65" idx="2"/>
+          </p:cNvCxnSpPr>
+          <p:nvPr/>
+        </p:nvCxnSpPr>
+        <p:spPr>
+          <a:xfrm flipH="1">
+            <a:off x="7341506" y="6393894"/>
+            <a:ext cx="3077125" cy="464106"/>
           </a:xfrm>
           <a:prstGeom prst="straightConnector1">
             <a:avLst/>
@@ -10857,6 +11544,259 @@
           </a:fontRef>
         </p:style>
       </p:cxnSp>
+      <p:sp>
+        <p:nvSpPr>
+          <p:cNvPr id="2" name="Geschweifte Klammer rechts 1">
+            <a:extLst>
+              <a:ext uri="{FF2B5EF4-FFF2-40B4-BE49-F238E27FC236}">
+                <a16:creationId xmlns:a16="http://schemas.microsoft.com/office/drawing/2014/main" id="{4F416831-F719-3B3B-EBB3-0F9D5443F052}"/>
+              </a:ext>
+            </a:extLst>
+          </p:cNvPr>
+          <p:cNvSpPr/>
+          <p:nvPr/>
+        </p:nvSpPr>
+        <p:spPr>
+          <a:xfrm>
+            <a:off x="7753266" y="741378"/>
+            <a:ext cx="261610" cy="740925"/>
+          </a:xfrm>
+          <a:prstGeom prst="rightBrace">
+            <a:avLst>
+              <a:gd name="adj1" fmla="val 39947"/>
+              <a:gd name="adj2" fmla="val 50000"/>
+            </a:avLst>
+          </a:prstGeom>
+          <a:ln w="19050"/>
+        </p:spPr>
+        <p:style>
+          <a:lnRef idx="1">
+            <a:schemeClr val="dk1"/>
+          </a:lnRef>
+          <a:fillRef idx="0">
+            <a:schemeClr val="dk1"/>
+          </a:fillRef>
+          <a:effectRef idx="0">
+            <a:schemeClr val="dk1"/>
+          </a:effectRef>
+          <a:fontRef idx="minor">
+            <a:schemeClr val="tx1"/>
+          </a:fontRef>
+        </p:style>
+        <p:txBody>
+          <a:bodyPr rtlCol="0" anchor="ctr"/>
+          <a:lstStyle/>
+          <a:p>
+            <a:pPr algn="ctr"/>
+            <a:endParaRPr lang="de-DE" sz="1100"/>
+          </a:p>
+        </p:txBody>
+      </p:sp>
+      <p:sp>
+        <p:nvSpPr>
+          <p:cNvPr id="3" name="Textfeld 2">
+            <a:extLst>
+              <a:ext uri="{FF2B5EF4-FFF2-40B4-BE49-F238E27FC236}">
+                <a16:creationId xmlns:a16="http://schemas.microsoft.com/office/drawing/2014/main" id="{3E30CD65-D319-0BFC-8F74-A787647CE585}"/>
+              </a:ext>
+            </a:extLst>
+          </p:cNvPr>
+          <p:cNvSpPr txBox="1"/>
+          <p:nvPr/>
+        </p:nvSpPr>
+        <p:spPr>
+          <a:xfrm>
+            <a:off x="7950517" y="971902"/>
+            <a:ext cx="1129934" cy="261610"/>
+          </a:xfrm>
+          <a:prstGeom prst="rect">
+            <a:avLst/>
+          </a:prstGeom>
+          <a:noFill/>
+        </p:spPr>
+        <p:txBody>
+          <a:bodyPr wrap="square" rtlCol="0">
+            <a:spAutoFit/>
+          </a:bodyPr>
+          <a:lstStyle/>
+          <a:p>
+            <a:pPr algn="ctr"/>
+            <a:r>
+              <a:rPr lang="de-DE" sz="1100" u="sng" dirty="0"/>
+              <a:t>Cross </a:t>
+            </a:r>
+            <a:r>
+              <a:rPr lang="de-DE" sz="1100" u="sng" dirty="0" err="1"/>
+              <a:t>Testing</a:t>
+            </a:r>
+            <a:endParaRPr lang="de-DE" sz="1100" u="sng" dirty="0"/>
+          </a:p>
+        </p:txBody>
+      </p:sp>
+      <p:sp>
+        <p:nvSpPr>
+          <p:cNvPr id="5" name="Textfeld 4">
+            <a:extLst>
+              <a:ext uri="{FF2B5EF4-FFF2-40B4-BE49-F238E27FC236}">
+                <a16:creationId xmlns:a16="http://schemas.microsoft.com/office/drawing/2014/main" id="{B17C557B-8B59-3BAC-BE6F-7E8B448567D6}"/>
+              </a:ext>
+            </a:extLst>
+          </p:cNvPr>
+          <p:cNvSpPr txBox="1"/>
+          <p:nvPr/>
+        </p:nvSpPr>
+        <p:spPr>
+          <a:xfrm>
+            <a:off x="8173180" y="1224195"/>
+            <a:ext cx="1806495" cy="261610"/>
+          </a:xfrm>
+          <a:prstGeom prst="rect">
+            <a:avLst/>
+          </a:prstGeom>
+          <a:noFill/>
+        </p:spPr>
+        <p:txBody>
+          <a:bodyPr wrap="square" rtlCol="0">
+            <a:spAutoFit/>
+          </a:bodyPr>
+          <a:lstStyle/>
+          <a:p>
+            <a:pPr marL="180975" indent="-180975">
+              <a:buFont typeface="Arial" panose="020B0604020202020204" pitchFamily="34" charset="0"/>
+              <a:buChar char="•"/>
+            </a:pPr>
+            <a:r>
+              <a:rPr lang="de-DE" sz="1100" dirty="0"/>
+              <a:t>K-</a:t>
+            </a:r>
+            <a:r>
+              <a:rPr lang="de-DE" sz="1100" dirty="0" err="1"/>
+              <a:t>fold</a:t>
+            </a:r>
+            <a:r>
+              <a:rPr lang="de-DE" sz="1100" dirty="0"/>
+              <a:t> </a:t>
+            </a:r>
+            <a:r>
+              <a:rPr lang="de-DE" sz="1100" dirty="0" err="1"/>
+              <a:t>cross</a:t>
+            </a:r>
+            <a:r>
+              <a:rPr lang="de-DE" sz="1100" dirty="0"/>
+              <a:t>-validation</a:t>
+            </a:r>
+          </a:p>
+        </p:txBody>
+      </p:sp>
+      <p:sp>
+        <p:nvSpPr>
+          <p:cNvPr id="6" name="Geschweifte Klammer rechts 5">
+            <a:extLst>
+              <a:ext uri="{FF2B5EF4-FFF2-40B4-BE49-F238E27FC236}">
+                <a16:creationId xmlns:a16="http://schemas.microsoft.com/office/drawing/2014/main" id="{955820D5-F306-A509-388C-3EA5E7CD1438}"/>
+              </a:ext>
+            </a:extLst>
+          </p:cNvPr>
+          <p:cNvSpPr/>
+          <p:nvPr/>
+        </p:nvSpPr>
+        <p:spPr>
+          <a:xfrm rot="10800000">
+            <a:off x="712651" y="4968586"/>
+            <a:ext cx="261610" cy="1425223"/>
+          </a:xfrm>
+          <a:prstGeom prst="rightBrace">
+            <a:avLst>
+              <a:gd name="adj1" fmla="val 39947"/>
+              <a:gd name="adj2" fmla="val 50000"/>
+            </a:avLst>
+          </a:prstGeom>
+          <a:ln w="19050"/>
+        </p:spPr>
+        <p:style>
+          <a:lnRef idx="1">
+            <a:schemeClr val="dk1"/>
+          </a:lnRef>
+          <a:fillRef idx="0">
+            <a:schemeClr val="dk1"/>
+          </a:fillRef>
+          <a:effectRef idx="0">
+            <a:schemeClr val="dk1"/>
+          </a:effectRef>
+          <a:fontRef idx="minor">
+            <a:schemeClr val="tx1"/>
+          </a:fontRef>
+        </p:style>
+        <p:txBody>
+          <a:bodyPr rtlCol="0" anchor="ctr"/>
+          <a:lstStyle/>
+          <a:p>
+            <a:pPr algn="ctr"/>
+            <a:endParaRPr lang="de-DE" sz="1100"/>
+          </a:p>
+        </p:txBody>
+      </p:sp>
+      <p:sp>
+        <p:nvSpPr>
+          <p:cNvPr id="7" name="Textfeld 6">
+            <a:extLst>
+              <a:ext uri="{FF2B5EF4-FFF2-40B4-BE49-F238E27FC236}">
+                <a16:creationId xmlns:a16="http://schemas.microsoft.com/office/drawing/2014/main" id="{EF961EA1-6770-5012-AE1E-6F68F17C0843}"/>
+              </a:ext>
+            </a:extLst>
+          </p:cNvPr>
+          <p:cNvSpPr txBox="1"/>
+          <p:nvPr/>
+        </p:nvSpPr>
+        <p:spPr>
+          <a:xfrm>
+            <a:off x="-60929" y="5163542"/>
+            <a:ext cx="1075645" cy="600164"/>
+          </a:xfrm>
+          <a:prstGeom prst="rect">
+            <a:avLst/>
+          </a:prstGeom>
+          <a:noFill/>
+        </p:spPr>
+        <p:txBody>
+          <a:bodyPr wrap="square" rtlCol="0">
+            <a:spAutoFit/>
+          </a:bodyPr>
+          <a:lstStyle/>
+          <a:p>
+            <a:pPr marL="180975" indent="-180975">
+              <a:buFont typeface="Arial" panose="020B0604020202020204" pitchFamily="34" charset="0"/>
+              <a:buChar char="•"/>
+            </a:pPr>
+            <a:r>
+              <a:rPr lang="de-DE" sz="1100" dirty="0" err="1"/>
+              <a:t>TensorFlow</a:t>
+            </a:r>
+            <a:endParaRPr lang="de-DE" sz="1100" dirty="0"/>
+          </a:p>
+          <a:p>
+            <a:pPr marL="180975" indent="-180975">
+              <a:buFont typeface="Arial" panose="020B0604020202020204" pitchFamily="34" charset="0"/>
+              <a:buChar char="•"/>
+            </a:pPr>
+            <a:r>
+              <a:rPr lang="de-DE" sz="1100" dirty="0"/>
+              <a:t>Keras</a:t>
+            </a:r>
+          </a:p>
+          <a:p>
+            <a:pPr marL="180975" indent="-180975">
+              <a:buFont typeface="Arial" panose="020B0604020202020204" pitchFamily="34" charset="0"/>
+              <a:buChar char="•"/>
+            </a:pPr>
+            <a:r>
+              <a:rPr lang="de-DE" sz="1100" dirty="0" err="1"/>
+              <a:t>PyTorch</a:t>
+            </a:r>
+            <a:endParaRPr lang="de-DE" sz="1100" dirty="0"/>
+          </a:p>
+        </p:txBody>
+      </p:sp>
     </p:spTree>
     <p:extLst>
       <p:ext uri="{BB962C8B-B14F-4D97-AF65-F5344CB8AC3E}">
@@ -11786,7 +12726,7 @@
         <p:spPr>
           <a:xfrm>
             <a:off x="8515481" y="4087062"/>
-            <a:ext cx="985491" cy="2292935"/>
+            <a:ext cx="985491" cy="2462213"/>
           </a:xfrm>
           <a:prstGeom prst="rect">
             <a:avLst/>
@@ -11933,6 +12873,21 @@
             <a:r>
               <a:rPr lang="de-DE" sz="1100" dirty="0" err="1"/>
               <a:t>Reward</a:t>
+            </a:r>
+            <a:endParaRPr lang="de-DE" sz="1100" dirty="0"/>
+          </a:p>
+          <a:p>
+            <a:pPr marL="180975" indent="-180975">
+              <a:buFont typeface="Arial" panose="020B0604020202020204" pitchFamily="34" charset="0"/>
+              <a:buChar char="•"/>
+            </a:pPr>
+            <a:r>
+              <a:rPr lang="de-DE" sz="1100" dirty="0"/>
+              <a:t>Log </a:t>
+            </a:r>
+            <a:r>
+              <a:rPr lang="de-DE" sz="1100" dirty="0" err="1"/>
+              <a:t>loss</a:t>
             </a:r>
             <a:endParaRPr lang="de-DE" sz="1100" dirty="0"/>
           </a:p>
@@ -14839,6 +15794,156 @@
           </a:fontRef>
         </p:style>
       </p:cxnSp>
+      <p:sp>
+        <p:nvSpPr>
+          <p:cNvPr id="2" name="Textfeld 1">
+            <a:extLst>
+              <a:ext uri="{FF2B5EF4-FFF2-40B4-BE49-F238E27FC236}">
+                <a16:creationId xmlns:a16="http://schemas.microsoft.com/office/drawing/2014/main" id="{1060F636-43C7-7324-13F0-291D1660FC6B}"/>
+              </a:ext>
+            </a:extLst>
+          </p:cNvPr>
+          <p:cNvSpPr txBox="1"/>
+          <p:nvPr/>
+        </p:nvSpPr>
+        <p:spPr>
+          <a:xfrm>
+            <a:off x="10607364" y="293689"/>
+            <a:ext cx="1431247" cy="261610"/>
+          </a:xfrm>
+          <a:prstGeom prst="rect">
+            <a:avLst/>
+          </a:prstGeom>
+          <a:noFill/>
+          <a:ln>
+            <a:solidFill>
+              <a:schemeClr val="tx1"/>
+            </a:solidFill>
+          </a:ln>
+        </p:spPr>
+        <p:txBody>
+          <a:bodyPr wrap="square" rtlCol="0">
+            <a:spAutoFit/>
+          </a:bodyPr>
+          <a:lstStyle/>
+          <a:p>
+            <a:pPr algn="ctr"/>
+            <a:r>
+              <a:rPr lang="de-DE" sz="1100" dirty="0"/>
+              <a:t>Model-</a:t>
+            </a:r>
+            <a:r>
+              <a:rPr lang="de-DE" sz="1100" dirty="0" err="1"/>
+              <a:t>Logging</a:t>
+            </a:r>
+            <a:endParaRPr lang="de-DE" sz="1100" dirty="0"/>
+          </a:p>
+        </p:txBody>
+      </p:sp>
+      <p:sp>
+        <p:nvSpPr>
+          <p:cNvPr id="8" name="Textfeld 7">
+            <a:extLst>
+              <a:ext uri="{FF2B5EF4-FFF2-40B4-BE49-F238E27FC236}">
+                <a16:creationId xmlns:a16="http://schemas.microsoft.com/office/drawing/2014/main" id="{38024BF0-6745-1FAB-F100-46361CA06A55}"/>
+              </a:ext>
+            </a:extLst>
+          </p:cNvPr>
+          <p:cNvSpPr txBox="1"/>
+          <p:nvPr/>
+        </p:nvSpPr>
+        <p:spPr>
+          <a:xfrm>
+            <a:off x="10758443" y="579283"/>
+            <a:ext cx="1280168" cy="1277273"/>
+          </a:xfrm>
+          <a:prstGeom prst="rect">
+            <a:avLst/>
+          </a:prstGeom>
+          <a:noFill/>
+        </p:spPr>
+        <p:txBody>
+          <a:bodyPr wrap="square" rtlCol="0">
+            <a:spAutoFit/>
+          </a:bodyPr>
+          <a:lstStyle/>
+          <a:p>
+            <a:pPr marL="180975" indent="-180975">
+              <a:buFont typeface="Arial" panose="020B0604020202020204" pitchFamily="34" charset="0"/>
+              <a:buChar char="•"/>
+            </a:pPr>
+            <a:r>
+              <a:rPr lang="de-DE" sz="1100" dirty="0"/>
+              <a:t>Model </a:t>
+            </a:r>
+            <a:r>
+              <a:rPr lang="de-DE" sz="1100" dirty="0" err="1"/>
+              <a:t>metadata</a:t>
+            </a:r>
+            <a:endParaRPr lang="de-DE" sz="1100" dirty="0"/>
+          </a:p>
+          <a:p>
+            <a:pPr marL="180975" indent="-180975">
+              <a:buFont typeface="Arial" panose="020B0604020202020204" pitchFamily="34" charset="0"/>
+              <a:buChar char="•"/>
+            </a:pPr>
+            <a:r>
+              <a:rPr lang="de-DE" sz="1100" dirty="0"/>
+              <a:t>Model </a:t>
+            </a:r>
+            <a:r>
+              <a:rPr lang="de-DE" sz="1100" dirty="0" err="1"/>
+              <a:t>inputs</a:t>
+            </a:r>
+            <a:endParaRPr lang="de-DE" sz="1100" dirty="0"/>
+          </a:p>
+          <a:p>
+            <a:pPr marL="180975" indent="-180975">
+              <a:buFont typeface="Arial" panose="020B0604020202020204" pitchFamily="34" charset="0"/>
+              <a:buChar char="•"/>
+            </a:pPr>
+            <a:r>
+              <a:rPr lang="de-DE" sz="1100" dirty="0"/>
+              <a:t>Model </a:t>
+            </a:r>
+            <a:r>
+              <a:rPr lang="de-DE" sz="1100" dirty="0" err="1"/>
+              <a:t>outputs</a:t>
+            </a:r>
+            <a:endParaRPr lang="de-DE" sz="1100" dirty="0"/>
+          </a:p>
+          <a:p>
+            <a:pPr marL="180975" indent="-180975">
+              <a:buFont typeface="Arial" panose="020B0604020202020204" pitchFamily="34" charset="0"/>
+              <a:buChar char="•"/>
+            </a:pPr>
+            <a:r>
+              <a:rPr lang="de-DE" sz="1100" dirty="0"/>
+              <a:t>System </a:t>
+            </a:r>
+            <a:r>
+              <a:rPr lang="de-DE" sz="1100" dirty="0" err="1"/>
+              <a:t>action</a:t>
+            </a:r>
+            <a:endParaRPr lang="de-DE" sz="1100" dirty="0"/>
+          </a:p>
+          <a:p>
+            <a:pPr marL="180975" indent="-180975">
+              <a:buFont typeface="Arial" panose="020B0604020202020204" pitchFamily="34" charset="0"/>
+              <a:buChar char="•"/>
+            </a:pPr>
+            <a:r>
+              <a:rPr lang="de-DE" sz="1100" dirty="0"/>
+              <a:t>Model </a:t>
+            </a:r>
+            <a:r>
+              <a:rPr lang="de-DE" sz="1100" dirty="0" err="1"/>
+              <a:t>explanation</a:t>
+            </a:r>
+            <a:endParaRPr lang="de-DE" sz="1100" dirty="0"/>
+          </a:p>
+        </p:txBody>
+      </p:sp>
     </p:spTree>
     <p:extLst>
       <p:ext uri="{BB962C8B-B14F-4D97-AF65-F5344CB8AC3E}">
@@ -14923,8 +16028,8 @@
         </p:nvSpPr>
         <p:spPr>
           <a:xfrm>
-            <a:off x="3136792" y="195378"/>
-            <a:ext cx="2086644" cy="261610"/>
+            <a:off x="2929109" y="1287512"/>
+            <a:ext cx="2502009" cy="261610"/>
           </a:xfrm>
           <a:prstGeom prst="rect">
             <a:avLst/>
@@ -14967,7 +16072,10 @@
               <a:rPr lang="de-DE" sz="1100" dirty="0" err="1"/>
               <a:t>Production</a:t>
             </a:r>
-            <a:endParaRPr lang="de-DE" sz="1100" dirty="0"/>
+            <a:r>
+              <a:rPr lang="de-DE" sz="1100" dirty="0"/>
+              <a:t>: CI/CD</a:t>
+            </a:r>
           </a:p>
         </p:txBody>
       </p:sp>
@@ -14985,7 +16093,7 @@
         </p:nvSpPr>
         <p:spPr>
           <a:xfrm>
-            <a:off x="3212687" y="722511"/>
+            <a:off x="376455" y="2574288"/>
             <a:ext cx="3127153" cy="1277273"/>
           </a:xfrm>
           <a:prstGeom prst="rect">
@@ -15120,7 +16228,7 @@
         </p:nvSpPr>
         <p:spPr>
           <a:xfrm>
-            <a:off x="3070549" y="456988"/>
+            <a:off x="234317" y="2308765"/>
             <a:ext cx="1492741" cy="261610"/>
           </a:xfrm>
           <a:prstGeom prst="rect">
@@ -15164,7 +16272,7 @@
         </p:nvSpPr>
         <p:spPr>
           <a:xfrm>
-            <a:off x="3136792" y="2181199"/>
+            <a:off x="300560" y="4032976"/>
             <a:ext cx="2370091" cy="1446550"/>
           </a:xfrm>
           <a:prstGeom prst="rect">
@@ -15295,7 +16403,7 @@
         </p:nvSpPr>
         <p:spPr>
           <a:xfrm>
-            <a:off x="3212687" y="4155851"/>
+            <a:off x="376455" y="6007628"/>
             <a:ext cx="2370091" cy="430887"/>
           </a:xfrm>
           <a:prstGeom prst="rect">
@@ -15358,7 +16466,7 @@
         </p:nvSpPr>
         <p:spPr>
           <a:xfrm>
-            <a:off x="3070549" y="3890328"/>
+            <a:off x="234317" y="5742105"/>
             <a:ext cx="1492741" cy="261610"/>
           </a:xfrm>
           <a:prstGeom prst="rect">
@@ -15402,7 +16510,7 @@
         </p:nvSpPr>
         <p:spPr>
           <a:xfrm>
-            <a:off x="3070548" y="4549235"/>
+            <a:off x="234316" y="6401012"/>
             <a:ext cx="1492741" cy="261610"/>
           </a:xfrm>
           <a:prstGeom prst="rect">
@@ -15426,6 +16534,1760 @@
               <a:t>Optimization</a:t>
             </a:r>
             <a:endParaRPr lang="de-DE" sz="1100" u="sng" dirty="0"/>
+          </a:p>
+        </p:txBody>
+      </p:sp>
+      <p:sp>
+        <p:nvSpPr>
+          <p:cNvPr id="8" name="Textfeld 7">
+            <a:extLst>
+              <a:ext uri="{FF2B5EF4-FFF2-40B4-BE49-F238E27FC236}">
+                <a16:creationId xmlns:a16="http://schemas.microsoft.com/office/drawing/2014/main" id="{FAE4625B-3D77-7C43-BA94-E1532EA521FD}"/>
+              </a:ext>
+            </a:extLst>
+          </p:cNvPr>
+          <p:cNvSpPr txBox="1"/>
+          <p:nvPr/>
+        </p:nvSpPr>
+        <p:spPr>
+          <a:xfrm>
+            <a:off x="3136792" y="3187052"/>
+            <a:ext cx="2086644" cy="261610"/>
+          </a:xfrm>
+          <a:prstGeom prst="rect">
+            <a:avLst/>
+          </a:prstGeom>
+          <a:noFill/>
+          <a:ln>
+            <a:solidFill>
+              <a:schemeClr val="tx1"/>
+            </a:solidFill>
+          </a:ln>
+        </p:spPr>
+        <p:txBody>
+          <a:bodyPr wrap="square" rtlCol="0">
+            <a:spAutoFit/>
+          </a:bodyPr>
+          <a:lstStyle/>
+          <a:p>
+            <a:pPr algn="ctr"/>
+            <a:r>
+              <a:rPr lang="de-DE" sz="1100" dirty="0"/>
+              <a:t>Front End User Interface</a:t>
+            </a:r>
+          </a:p>
+        </p:txBody>
+      </p:sp>
+      <p:sp>
+        <p:nvSpPr>
+          <p:cNvPr id="9" name="Textfeld 8">
+            <a:extLst>
+              <a:ext uri="{FF2B5EF4-FFF2-40B4-BE49-F238E27FC236}">
+                <a16:creationId xmlns:a16="http://schemas.microsoft.com/office/drawing/2014/main" id="{0D6F8498-0F39-BF13-428F-CD494FBEE7F1}"/>
+              </a:ext>
+            </a:extLst>
+          </p:cNvPr>
+          <p:cNvSpPr txBox="1"/>
+          <p:nvPr/>
+        </p:nvSpPr>
+        <p:spPr>
+          <a:xfrm>
+            <a:off x="5864754" y="3187053"/>
+            <a:ext cx="1741115" cy="261610"/>
+          </a:xfrm>
+          <a:prstGeom prst="rect">
+            <a:avLst/>
+          </a:prstGeom>
+          <a:noFill/>
+        </p:spPr>
+        <p:txBody>
+          <a:bodyPr wrap="square" rtlCol="0">
+            <a:spAutoFit/>
+          </a:bodyPr>
+          <a:lstStyle/>
+          <a:p>
+            <a:pPr algn="ctr"/>
+            <a:r>
+              <a:rPr lang="de-DE" sz="1100" u="sng" dirty="0"/>
+              <a:t>Dashboard </a:t>
+            </a:r>
+            <a:r>
+              <a:rPr lang="de-DE" sz="1100" u="sng" dirty="0" err="1"/>
+              <a:t>solutions</a:t>
+            </a:r>
+            <a:endParaRPr lang="de-DE" sz="1100" u="sng" dirty="0"/>
+          </a:p>
+        </p:txBody>
+      </p:sp>
+      <p:cxnSp>
+        <p:nvCxnSpPr>
+          <p:cNvPr id="10" name="Gerade Verbindung mit Pfeil 9">
+            <a:extLst>
+              <a:ext uri="{FF2B5EF4-FFF2-40B4-BE49-F238E27FC236}">
+                <a16:creationId xmlns:a16="http://schemas.microsoft.com/office/drawing/2014/main" id="{004DA890-9139-CD8E-6001-F9A98D6D994C}"/>
+              </a:ext>
+            </a:extLst>
+          </p:cNvPr>
+          <p:cNvCxnSpPr>
+            <a:cxnSpLocks/>
+            <a:endCxn id="9" idx="1"/>
+          </p:cNvCxnSpPr>
+          <p:nvPr/>
+        </p:nvCxnSpPr>
+        <p:spPr>
+          <a:xfrm>
+            <a:off x="5223436" y="3317858"/>
+            <a:ext cx="641318" cy="0"/>
+          </a:xfrm>
+          <a:prstGeom prst="straightConnector1">
+            <a:avLst/>
+          </a:prstGeom>
+          <a:ln>
+            <a:headEnd type="triangle"/>
+            <a:tailEnd type="triangle"/>
+          </a:ln>
+        </p:spPr>
+        <p:style>
+          <a:lnRef idx="1">
+            <a:schemeClr val="dk1"/>
+          </a:lnRef>
+          <a:fillRef idx="0">
+            <a:schemeClr val="dk1"/>
+          </a:fillRef>
+          <a:effectRef idx="0">
+            <a:schemeClr val="dk1"/>
+          </a:effectRef>
+          <a:fontRef idx="minor">
+            <a:schemeClr val="tx1"/>
+          </a:fontRef>
+        </p:style>
+      </p:cxnSp>
+      <p:sp>
+        <p:nvSpPr>
+          <p:cNvPr id="11" name="Textfeld 10">
+            <a:extLst>
+              <a:ext uri="{FF2B5EF4-FFF2-40B4-BE49-F238E27FC236}">
+                <a16:creationId xmlns:a16="http://schemas.microsoft.com/office/drawing/2014/main" id="{56AACDCE-659C-78A0-8D9F-C5EE9DBCEC04}"/>
+              </a:ext>
+            </a:extLst>
+          </p:cNvPr>
+          <p:cNvSpPr txBox="1"/>
+          <p:nvPr/>
+        </p:nvSpPr>
+        <p:spPr>
+          <a:xfrm>
+            <a:off x="6096000" y="3385442"/>
+            <a:ext cx="1473305" cy="600164"/>
+          </a:xfrm>
+          <a:prstGeom prst="rect">
+            <a:avLst/>
+          </a:prstGeom>
+          <a:noFill/>
+        </p:spPr>
+        <p:txBody>
+          <a:bodyPr wrap="square" rtlCol="0">
+            <a:spAutoFit/>
+          </a:bodyPr>
+          <a:lstStyle/>
+          <a:p>
+            <a:pPr marL="180975" indent="-180975">
+              <a:buFont typeface="Arial" panose="020B0604020202020204" pitchFamily="34" charset="0"/>
+              <a:buChar char="•"/>
+            </a:pPr>
+            <a:r>
+              <a:rPr lang="de-DE" sz="1100" dirty="0" err="1"/>
+              <a:t>streamlit</a:t>
+            </a:r>
+            <a:endParaRPr lang="de-DE" sz="1100" dirty="0"/>
+          </a:p>
+          <a:p>
+            <a:pPr marL="180975" indent="-180975">
+              <a:buFont typeface="Arial" panose="020B0604020202020204" pitchFamily="34" charset="0"/>
+              <a:buChar char="•"/>
+            </a:pPr>
+            <a:r>
+              <a:rPr lang="de-DE" sz="1100" dirty="0"/>
+              <a:t>Dash</a:t>
+            </a:r>
+          </a:p>
+          <a:p>
+            <a:pPr marL="180975" indent="-180975">
+              <a:buFont typeface="Arial" panose="020B0604020202020204" pitchFamily="34" charset="0"/>
+              <a:buChar char="•"/>
+            </a:pPr>
+            <a:r>
+              <a:rPr lang="de-DE" sz="1100" dirty="0" err="1"/>
+              <a:t>flask</a:t>
+            </a:r>
+            <a:endParaRPr lang="de-DE" sz="1100" dirty="0"/>
+          </a:p>
+        </p:txBody>
+      </p:sp>
+      <p:cxnSp>
+        <p:nvCxnSpPr>
+          <p:cNvPr id="12" name="Gerade Verbindung mit Pfeil 11">
+            <a:extLst>
+              <a:ext uri="{FF2B5EF4-FFF2-40B4-BE49-F238E27FC236}">
+                <a16:creationId xmlns:a16="http://schemas.microsoft.com/office/drawing/2014/main" id="{5CDDEC2B-61C3-EC58-2009-032E1173C433}"/>
+              </a:ext>
+            </a:extLst>
+          </p:cNvPr>
+          <p:cNvCxnSpPr>
+            <a:cxnSpLocks/>
+            <a:stCxn id="90" idx="2"/>
+            <a:endCxn id="19" idx="0"/>
+          </p:cNvCxnSpPr>
+          <p:nvPr/>
+        </p:nvCxnSpPr>
+        <p:spPr>
+          <a:xfrm flipH="1">
+            <a:off x="2865265" y="1549122"/>
+            <a:ext cx="1314849" cy="429092"/>
+          </a:xfrm>
+          <a:prstGeom prst="straightConnector1">
+            <a:avLst/>
+          </a:prstGeom>
+          <a:ln>
+            <a:tailEnd type="triangle"/>
+          </a:ln>
+        </p:spPr>
+        <p:style>
+          <a:lnRef idx="1">
+            <a:schemeClr val="dk1"/>
+          </a:lnRef>
+          <a:fillRef idx="0">
+            <a:schemeClr val="dk1"/>
+          </a:fillRef>
+          <a:effectRef idx="0">
+            <a:schemeClr val="dk1"/>
+          </a:effectRef>
+          <a:fontRef idx="minor">
+            <a:schemeClr val="tx1"/>
+          </a:fontRef>
+        </p:style>
+      </p:cxnSp>
+      <p:sp>
+        <p:nvSpPr>
+          <p:cNvPr id="16" name="Textfeld 15">
+            <a:extLst>
+              <a:ext uri="{FF2B5EF4-FFF2-40B4-BE49-F238E27FC236}">
+                <a16:creationId xmlns:a16="http://schemas.microsoft.com/office/drawing/2014/main" id="{16E11567-32A5-0C56-2810-41F3D3B58B91}"/>
+              </a:ext>
+            </a:extLst>
+          </p:cNvPr>
+          <p:cNvSpPr txBox="1"/>
+          <p:nvPr/>
+        </p:nvSpPr>
+        <p:spPr>
+          <a:xfrm>
+            <a:off x="452814" y="1370812"/>
+            <a:ext cx="1473305" cy="430887"/>
+          </a:xfrm>
+          <a:prstGeom prst="rect">
+            <a:avLst/>
+          </a:prstGeom>
+          <a:noFill/>
+        </p:spPr>
+        <p:txBody>
+          <a:bodyPr wrap="square" rtlCol="0">
+            <a:spAutoFit/>
+          </a:bodyPr>
+          <a:lstStyle/>
+          <a:p>
+            <a:pPr marL="180975" indent="-180975">
+              <a:buFont typeface="Arial" panose="020B0604020202020204" pitchFamily="34" charset="0"/>
+              <a:buChar char="•"/>
+            </a:pPr>
+            <a:r>
+              <a:rPr lang="de-DE" sz="1100" dirty="0"/>
+              <a:t>Monitoring</a:t>
+            </a:r>
+          </a:p>
+          <a:p>
+            <a:pPr marL="180975" indent="-180975">
+              <a:buFont typeface="Arial" panose="020B0604020202020204" pitchFamily="34" charset="0"/>
+              <a:buChar char="•"/>
+            </a:pPr>
+            <a:r>
+              <a:rPr lang="de-DE" sz="1100" dirty="0"/>
+              <a:t>Kill-Switch</a:t>
+            </a:r>
+          </a:p>
+        </p:txBody>
+      </p:sp>
+      <p:sp>
+        <p:nvSpPr>
+          <p:cNvPr id="19" name="Textfeld 18">
+            <a:extLst>
+              <a:ext uri="{FF2B5EF4-FFF2-40B4-BE49-F238E27FC236}">
+                <a16:creationId xmlns:a16="http://schemas.microsoft.com/office/drawing/2014/main" id="{96E97220-7610-6D95-904F-969286818FD6}"/>
+              </a:ext>
+            </a:extLst>
+          </p:cNvPr>
+          <p:cNvSpPr txBox="1"/>
+          <p:nvPr/>
+        </p:nvSpPr>
+        <p:spPr>
+          <a:xfrm>
+            <a:off x="1668237" y="1978214"/>
+            <a:ext cx="2394055" cy="261610"/>
+          </a:xfrm>
+          <a:prstGeom prst="rect">
+            <a:avLst/>
+          </a:prstGeom>
+          <a:noFill/>
+        </p:spPr>
+        <p:txBody>
+          <a:bodyPr wrap="square" rtlCol="0">
+            <a:spAutoFit/>
+          </a:bodyPr>
+          <a:lstStyle/>
+          <a:p>
+            <a:pPr algn="ctr"/>
+            <a:r>
+              <a:rPr lang="de-DE" sz="1100" u="sng" dirty="0"/>
+              <a:t>Model-</a:t>
+            </a:r>
+            <a:r>
+              <a:rPr lang="de-DE" sz="1100" u="sng" dirty="0" err="1"/>
+              <a:t>as</a:t>
+            </a:r>
+            <a:r>
+              <a:rPr lang="de-DE" sz="1100" u="sng" dirty="0"/>
+              <a:t>-a-service, live-</a:t>
+            </a:r>
+            <a:r>
+              <a:rPr lang="de-DE" sz="1100" u="sng" dirty="0" err="1"/>
+              <a:t>scoring</a:t>
+            </a:r>
+            <a:r>
+              <a:rPr lang="de-DE" sz="1100" u="sng" dirty="0"/>
+              <a:t> </a:t>
+            </a:r>
+            <a:r>
+              <a:rPr lang="de-DE" sz="1100" u="sng" dirty="0" err="1"/>
+              <a:t>model</a:t>
+            </a:r>
+            <a:endParaRPr lang="de-DE" sz="1100" u="sng" dirty="0"/>
+          </a:p>
+        </p:txBody>
+      </p:sp>
+      <p:sp>
+        <p:nvSpPr>
+          <p:cNvPr id="20" name="Textfeld 19">
+            <a:extLst>
+              <a:ext uri="{FF2B5EF4-FFF2-40B4-BE49-F238E27FC236}">
+                <a16:creationId xmlns:a16="http://schemas.microsoft.com/office/drawing/2014/main" id="{88211F46-9A40-E1E3-CA6E-859AFA6A22F1}"/>
+              </a:ext>
+            </a:extLst>
+          </p:cNvPr>
+          <p:cNvSpPr txBox="1"/>
+          <p:nvPr/>
+        </p:nvSpPr>
+        <p:spPr>
+          <a:xfrm>
+            <a:off x="4352878" y="1978214"/>
+            <a:ext cx="1741115" cy="261610"/>
+          </a:xfrm>
+          <a:prstGeom prst="rect">
+            <a:avLst/>
+          </a:prstGeom>
+          <a:noFill/>
+        </p:spPr>
+        <p:txBody>
+          <a:bodyPr wrap="square" rtlCol="0">
+            <a:spAutoFit/>
+          </a:bodyPr>
+          <a:lstStyle/>
+          <a:p>
+            <a:pPr algn="ctr"/>
+            <a:r>
+              <a:rPr lang="de-DE" sz="1100" u="sng" dirty="0"/>
+              <a:t>Embedded </a:t>
+            </a:r>
+            <a:r>
+              <a:rPr lang="de-DE" sz="1100" u="sng" dirty="0" err="1"/>
+              <a:t>model</a:t>
+            </a:r>
+            <a:endParaRPr lang="de-DE" sz="1100" u="sng" dirty="0"/>
+          </a:p>
+        </p:txBody>
+      </p:sp>
+      <p:cxnSp>
+        <p:nvCxnSpPr>
+          <p:cNvPr id="21" name="Gerade Verbindung mit Pfeil 20">
+            <a:extLst>
+              <a:ext uri="{FF2B5EF4-FFF2-40B4-BE49-F238E27FC236}">
+                <a16:creationId xmlns:a16="http://schemas.microsoft.com/office/drawing/2014/main" id="{EEDD43BA-5430-6500-64F9-7109153015E8}"/>
+              </a:ext>
+            </a:extLst>
+          </p:cNvPr>
+          <p:cNvCxnSpPr>
+            <a:cxnSpLocks/>
+            <a:stCxn id="90" idx="2"/>
+            <a:endCxn id="20" idx="0"/>
+          </p:cNvCxnSpPr>
+          <p:nvPr/>
+        </p:nvCxnSpPr>
+        <p:spPr>
+          <a:xfrm>
+            <a:off x="4180114" y="1549122"/>
+            <a:ext cx="1043322" cy="429092"/>
+          </a:xfrm>
+          <a:prstGeom prst="straightConnector1">
+            <a:avLst/>
+          </a:prstGeom>
+          <a:ln>
+            <a:tailEnd type="triangle"/>
+          </a:ln>
+        </p:spPr>
+        <p:style>
+          <a:lnRef idx="1">
+            <a:schemeClr val="dk1"/>
+          </a:lnRef>
+          <a:fillRef idx="0">
+            <a:schemeClr val="dk1"/>
+          </a:fillRef>
+          <a:effectRef idx="0">
+            <a:schemeClr val="dk1"/>
+          </a:effectRef>
+          <a:fontRef idx="minor">
+            <a:schemeClr val="tx1"/>
+          </a:fontRef>
+        </p:style>
+      </p:cxnSp>
+      <p:sp>
+        <p:nvSpPr>
+          <p:cNvPr id="25" name="Textfeld 24">
+            <a:extLst>
+              <a:ext uri="{FF2B5EF4-FFF2-40B4-BE49-F238E27FC236}">
+                <a16:creationId xmlns:a16="http://schemas.microsoft.com/office/drawing/2014/main" id="{555DA053-54C3-0992-7490-15320F9DC678}"/>
+              </a:ext>
+            </a:extLst>
+          </p:cNvPr>
+          <p:cNvSpPr txBox="1"/>
+          <p:nvPr/>
+        </p:nvSpPr>
+        <p:spPr>
+          <a:xfrm>
+            <a:off x="1768439" y="2234741"/>
+            <a:ext cx="1473305" cy="261610"/>
+          </a:xfrm>
+          <a:prstGeom prst="rect">
+            <a:avLst/>
+          </a:prstGeom>
+          <a:noFill/>
+        </p:spPr>
+        <p:txBody>
+          <a:bodyPr wrap="square" rtlCol="0">
+            <a:spAutoFit/>
+          </a:bodyPr>
+          <a:lstStyle/>
+          <a:p>
+            <a:pPr marL="180975" indent="-180975">
+              <a:buFont typeface="Arial" panose="020B0604020202020204" pitchFamily="34" charset="0"/>
+              <a:buChar char="•"/>
+            </a:pPr>
+            <a:r>
+              <a:rPr lang="de-DE" sz="1100" dirty="0"/>
+              <a:t>REST API </a:t>
+            </a:r>
+            <a:r>
+              <a:rPr lang="de-DE" sz="1100" dirty="0" err="1"/>
+              <a:t>Endpoint</a:t>
+            </a:r>
+            <a:endParaRPr lang="de-DE" sz="1100" dirty="0"/>
+          </a:p>
+        </p:txBody>
+      </p:sp>
+      <p:sp>
+        <p:nvSpPr>
+          <p:cNvPr id="26" name="Textfeld 25">
+            <a:extLst>
+              <a:ext uri="{FF2B5EF4-FFF2-40B4-BE49-F238E27FC236}">
+                <a16:creationId xmlns:a16="http://schemas.microsoft.com/office/drawing/2014/main" id="{11820C0F-ED72-4561-3B2D-51A2F6A8E056}"/>
+              </a:ext>
+            </a:extLst>
+          </p:cNvPr>
+          <p:cNvSpPr txBox="1"/>
+          <p:nvPr/>
+        </p:nvSpPr>
+        <p:spPr>
+          <a:xfrm>
+            <a:off x="4701775" y="2234741"/>
+            <a:ext cx="1682804" cy="261610"/>
+          </a:xfrm>
+          <a:prstGeom prst="rect">
+            <a:avLst/>
+          </a:prstGeom>
+          <a:noFill/>
+        </p:spPr>
+        <p:txBody>
+          <a:bodyPr wrap="square" rtlCol="0">
+            <a:spAutoFit/>
+          </a:bodyPr>
+          <a:lstStyle/>
+          <a:p>
+            <a:pPr marL="180975" indent="-180975">
+              <a:buFont typeface="Arial" panose="020B0604020202020204" pitchFamily="34" charset="0"/>
+              <a:buChar char="•"/>
+            </a:pPr>
+            <a:r>
+              <a:rPr lang="de-DE" sz="1100" dirty="0" err="1"/>
+              <a:t>Application</a:t>
+            </a:r>
+            <a:r>
+              <a:rPr lang="de-DE" sz="1100" dirty="0"/>
+              <a:t> </a:t>
+            </a:r>
+            <a:r>
+              <a:rPr lang="de-DE" sz="1100" dirty="0" err="1"/>
+              <a:t>embedding</a:t>
+            </a:r>
+            <a:endParaRPr lang="de-DE" sz="1100" dirty="0"/>
+          </a:p>
+        </p:txBody>
+      </p:sp>
+      <p:sp>
+        <p:nvSpPr>
+          <p:cNvPr id="27" name="Geschweifte Klammer rechts 26">
+            <a:extLst>
+              <a:ext uri="{FF2B5EF4-FFF2-40B4-BE49-F238E27FC236}">
+                <a16:creationId xmlns:a16="http://schemas.microsoft.com/office/drawing/2014/main" id="{5C6E94DC-22AD-5760-1DAD-F88C1AB1CE8E}"/>
+              </a:ext>
+            </a:extLst>
+          </p:cNvPr>
+          <p:cNvSpPr/>
+          <p:nvPr/>
+        </p:nvSpPr>
+        <p:spPr>
+          <a:xfrm>
+            <a:off x="9143020" y="1173024"/>
+            <a:ext cx="511628" cy="1871990"/>
+          </a:xfrm>
+          <a:prstGeom prst="rightBrace">
+            <a:avLst/>
+          </a:prstGeom>
+          <a:ln w="19050"/>
+        </p:spPr>
+        <p:style>
+          <a:lnRef idx="1">
+            <a:schemeClr val="dk1"/>
+          </a:lnRef>
+          <a:fillRef idx="0">
+            <a:schemeClr val="dk1"/>
+          </a:fillRef>
+          <a:effectRef idx="0">
+            <a:schemeClr val="dk1"/>
+          </a:effectRef>
+          <a:fontRef idx="minor">
+            <a:schemeClr val="tx1"/>
+          </a:fontRef>
+        </p:style>
+        <p:txBody>
+          <a:bodyPr rtlCol="0" anchor="ctr"/>
+          <a:lstStyle/>
+          <a:p>
+            <a:pPr algn="ctr"/>
+            <a:endParaRPr lang="de-DE" sz="1100"/>
+          </a:p>
+        </p:txBody>
+      </p:sp>
+      <p:sp>
+        <p:nvSpPr>
+          <p:cNvPr id="28" name="Textfeld 27">
+            <a:extLst>
+              <a:ext uri="{FF2B5EF4-FFF2-40B4-BE49-F238E27FC236}">
+                <a16:creationId xmlns:a16="http://schemas.microsoft.com/office/drawing/2014/main" id="{563A2025-B7B7-0A28-457B-8B7A74948B89}"/>
+              </a:ext>
+            </a:extLst>
+          </p:cNvPr>
+          <p:cNvSpPr txBox="1"/>
+          <p:nvPr/>
+        </p:nvSpPr>
+        <p:spPr>
+          <a:xfrm>
+            <a:off x="9654648" y="1973131"/>
+            <a:ext cx="1129934" cy="261610"/>
+          </a:xfrm>
+          <a:prstGeom prst="rect">
+            <a:avLst/>
+          </a:prstGeom>
+          <a:noFill/>
+        </p:spPr>
+        <p:txBody>
+          <a:bodyPr wrap="square" rtlCol="0">
+            <a:spAutoFit/>
+          </a:bodyPr>
+          <a:lstStyle/>
+          <a:p>
+            <a:pPr algn="ctr"/>
+            <a:r>
+              <a:rPr lang="de-DE" sz="1100" u="sng" dirty="0" err="1"/>
+              <a:t>Containerization</a:t>
+            </a:r>
+            <a:endParaRPr lang="de-DE" sz="1100" u="sng" dirty="0"/>
+          </a:p>
+        </p:txBody>
+      </p:sp>
+      <p:sp>
+        <p:nvSpPr>
+          <p:cNvPr id="29" name="Textfeld 28">
+            <a:extLst>
+              <a:ext uri="{FF2B5EF4-FFF2-40B4-BE49-F238E27FC236}">
+                <a16:creationId xmlns:a16="http://schemas.microsoft.com/office/drawing/2014/main" id="{CC2B987F-EA83-DE84-1872-9F2289BA922B}"/>
+              </a:ext>
+            </a:extLst>
+          </p:cNvPr>
+          <p:cNvSpPr txBox="1"/>
+          <p:nvPr/>
+        </p:nvSpPr>
+        <p:spPr>
+          <a:xfrm>
+            <a:off x="9654648" y="2208990"/>
+            <a:ext cx="2358059" cy="769441"/>
+          </a:xfrm>
+          <a:prstGeom prst="rect">
+            <a:avLst/>
+          </a:prstGeom>
+          <a:noFill/>
+        </p:spPr>
+        <p:txBody>
+          <a:bodyPr wrap="square" rtlCol="0">
+            <a:spAutoFit/>
+          </a:bodyPr>
+          <a:lstStyle/>
+          <a:p>
+            <a:pPr marL="180975" indent="-180975">
+              <a:buFont typeface="Arial" panose="020B0604020202020204" pitchFamily="34" charset="0"/>
+              <a:buChar char="•"/>
+            </a:pPr>
+            <a:r>
+              <a:rPr lang="de-DE" sz="1100" dirty="0"/>
+              <a:t>Docker Container</a:t>
+            </a:r>
+          </a:p>
+          <a:p>
+            <a:pPr marL="180975" indent="-180975">
+              <a:buFont typeface="Arial" panose="020B0604020202020204" pitchFamily="34" charset="0"/>
+              <a:buChar char="•"/>
+            </a:pPr>
+            <a:r>
+              <a:rPr lang="de-DE" sz="1100" dirty="0" err="1"/>
+              <a:t>Kubernetes</a:t>
+            </a:r>
+            <a:r>
+              <a:rPr lang="de-DE" sz="1100" dirty="0"/>
+              <a:t> Cluster </a:t>
+            </a:r>
+            <a:r>
+              <a:rPr lang="de-DE" sz="1100" dirty="0" err="1"/>
+              <a:t>controlling</a:t>
+            </a:r>
+            <a:r>
+              <a:rPr lang="de-DE" sz="1100" dirty="0"/>
+              <a:t> Docker </a:t>
+            </a:r>
+            <a:r>
+              <a:rPr lang="de-DE" sz="1100" dirty="0" err="1"/>
+              <a:t>containers</a:t>
+            </a:r>
+            <a:r>
+              <a:rPr lang="de-DE" sz="1100" dirty="0"/>
+              <a:t> in </a:t>
+            </a:r>
+            <a:r>
+              <a:rPr lang="de-DE" sz="1100" dirty="0" err="1"/>
+              <a:t>the</a:t>
+            </a:r>
+            <a:r>
+              <a:rPr lang="de-DE" sz="1100" dirty="0"/>
+              <a:t> </a:t>
+            </a:r>
+            <a:r>
+              <a:rPr lang="de-DE" sz="1100" dirty="0" err="1"/>
+              <a:t>cloud</a:t>
+            </a:r>
+            <a:endParaRPr lang="de-DE" sz="1100" dirty="0"/>
+          </a:p>
+          <a:p>
+            <a:pPr marL="180975" indent="-180975">
+              <a:buFont typeface="Arial" panose="020B0604020202020204" pitchFamily="34" charset="0"/>
+              <a:buChar char="•"/>
+            </a:pPr>
+            <a:r>
+              <a:rPr lang="de-DE" sz="1100" dirty="0"/>
+              <a:t>MS Azure </a:t>
+            </a:r>
+            <a:r>
+              <a:rPr lang="de-DE" sz="1100" dirty="0" err="1"/>
+              <a:t>cloud</a:t>
+            </a:r>
+            <a:r>
+              <a:rPr lang="de-DE" sz="1100" dirty="0"/>
+              <a:t> </a:t>
+            </a:r>
+            <a:r>
+              <a:rPr lang="de-DE" sz="1100" dirty="0" err="1"/>
+              <a:t>infratstructure</a:t>
+            </a:r>
+            <a:endParaRPr lang="de-DE" sz="1100" dirty="0"/>
+          </a:p>
+        </p:txBody>
+      </p:sp>
+      <p:sp>
+        <p:nvSpPr>
+          <p:cNvPr id="30" name="Textfeld 29">
+            <a:extLst>
+              <a:ext uri="{FF2B5EF4-FFF2-40B4-BE49-F238E27FC236}">
+                <a16:creationId xmlns:a16="http://schemas.microsoft.com/office/drawing/2014/main" id="{1F040B63-9792-A4C9-0E31-D052741489DB}"/>
+              </a:ext>
+            </a:extLst>
+          </p:cNvPr>
+          <p:cNvSpPr txBox="1"/>
+          <p:nvPr/>
+        </p:nvSpPr>
+        <p:spPr>
+          <a:xfrm>
+            <a:off x="3136792" y="128264"/>
+            <a:ext cx="2086644" cy="430887"/>
+          </a:xfrm>
+          <a:prstGeom prst="rect">
+            <a:avLst/>
+          </a:prstGeom>
+          <a:noFill/>
+          <a:ln>
+            <a:solidFill>
+              <a:schemeClr val="tx1"/>
+            </a:solidFill>
+          </a:ln>
+        </p:spPr>
+        <p:txBody>
+          <a:bodyPr wrap="square" rtlCol="0">
+            <a:spAutoFit/>
+          </a:bodyPr>
+          <a:lstStyle/>
+          <a:p>
+            <a:pPr algn="ctr"/>
+            <a:r>
+              <a:rPr lang="de-DE" sz="1100" dirty="0"/>
+              <a:t>Model </a:t>
+            </a:r>
+            <a:r>
+              <a:rPr lang="de-DE" sz="1100" dirty="0" err="1"/>
+              <a:t>Plausibility</a:t>
+            </a:r>
+            <a:r>
+              <a:rPr lang="de-DE" sz="1100" dirty="0"/>
+              <a:t> and </a:t>
+            </a:r>
+            <a:r>
+              <a:rPr lang="de-DE" sz="1100" dirty="0" err="1"/>
+              <a:t>driving</a:t>
+            </a:r>
+            <a:r>
+              <a:rPr lang="de-DE" sz="1100" dirty="0"/>
+              <a:t> variables</a:t>
+            </a:r>
+          </a:p>
+        </p:txBody>
+      </p:sp>
+      <p:sp>
+        <p:nvSpPr>
+          <p:cNvPr id="31" name="Textfeld 30">
+            <a:extLst>
+              <a:ext uri="{FF2B5EF4-FFF2-40B4-BE49-F238E27FC236}">
+                <a16:creationId xmlns:a16="http://schemas.microsoft.com/office/drawing/2014/main" id="{1E2B72D3-956B-D462-8957-252D3D60E3CA}"/>
+              </a:ext>
+            </a:extLst>
+          </p:cNvPr>
+          <p:cNvSpPr txBox="1"/>
+          <p:nvPr/>
+        </p:nvSpPr>
+        <p:spPr>
+          <a:xfrm>
+            <a:off x="3241744" y="586377"/>
+            <a:ext cx="2397056" cy="430887"/>
+          </a:xfrm>
+          <a:prstGeom prst="rect">
+            <a:avLst/>
+          </a:prstGeom>
+          <a:noFill/>
+        </p:spPr>
+        <p:txBody>
+          <a:bodyPr wrap="square" rtlCol="0">
+            <a:spAutoFit/>
+          </a:bodyPr>
+          <a:lstStyle/>
+          <a:p>
+            <a:pPr marL="180975" indent="-180975">
+              <a:buFont typeface="Arial" panose="020B0604020202020204" pitchFamily="34" charset="0"/>
+              <a:buChar char="•"/>
+            </a:pPr>
+            <a:r>
+              <a:rPr lang="de-DE" sz="1100" dirty="0"/>
+              <a:t>Partial </a:t>
+            </a:r>
+            <a:r>
+              <a:rPr lang="de-DE" sz="1100" dirty="0" err="1"/>
+              <a:t>dependency</a:t>
+            </a:r>
+            <a:r>
+              <a:rPr lang="de-DE" sz="1100" dirty="0"/>
+              <a:t> </a:t>
+            </a:r>
+            <a:r>
+              <a:rPr lang="de-DE" sz="1100" dirty="0" err="1"/>
+              <a:t>plots</a:t>
+            </a:r>
+            <a:endParaRPr lang="de-DE" sz="1100" dirty="0"/>
+          </a:p>
+          <a:p>
+            <a:pPr marL="180975" indent="-180975">
+              <a:buFont typeface="Arial" panose="020B0604020202020204" pitchFamily="34" charset="0"/>
+              <a:buChar char="•"/>
+            </a:pPr>
+            <a:r>
+              <a:rPr lang="de-DE" sz="1100" dirty="0"/>
+              <a:t>Shapley </a:t>
+            </a:r>
+            <a:r>
+              <a:rPr lang="de-DE" sz="1100" dirty="0" err="1"/>
+              <a:t>values</a:t>
+            </a:r>
+            <a:endParaRPr lang="de-DE" sz="1100" dirty="0"/>
+          </a:p>
+        </p:txBody>
+      </p:sp>
+      <p:sp>
+        <p:nvSpPr>
+          <p:cNvPr id="39" name="Textfeld 38">
+            <a:extLst>
+              <a:ext uri="{FF2B5EF4-FFF2-40B4-BE49-F238E27FC236}">
+                <a16:creationId xmlns:a16="http://schemas.microsoft.com/office/drawing/2014/main" id="{F77406F1-B75C-DD26-7A25-27DA275B19DC}"/>
+              </a:ext>
+            </a:extLst>
+          </p:cNvPr>
+          <p:cNvSpPr txBox="1"/>
+          <p:nvPr/>
+        </p:nvSpPr>
+        <p:spPr>
+          <a:xfrm>
+            <a:off x="6100287" y="790255"/>
+            <a:ext cx="2394055" cy="261610"/>
+          </a:xfrm>
+          <a:prstGeom prst="rect">
+            <a:avLst/>
+          </a:prstGeom>
+          <a:noFill/>
+        </p:spPr>
+        <p:txBody>
+          <a:bodyPr wrap="square" rtlCol="0">
+            <a:spAutoFit/>
+          </a:bodyPr>
+          <a:lstStyle/>
+          <a:p>
+            <a:pPr algn="ctr"/>
+            <a:r>
+              <a:rPr lang="de-DE" sz="1100" u="sng" dirty="0"/>
+              <a:t>AI Model </a:t>
+            </a:r>
+            <a:r>
+              <a:rPr lang="de-DE" sz="1100" u="sng" dirty="0" err="1"/>
+              <a:t>Artifacts</a:t>
+            </a:r>
+            <a:endParaRPr lang="de-DE" sz="1100" u="sng" dirty="0"/>
+          </a:p>
+        </p:txBody>
+      </p:sp>
+      <p:sp>
+        <p:nvSpPr>
+          <p:cNvPr id="40" name="Textfeld 39">
+            <a:extLst>
+              <a:ext uri="{FF2B5EF4-FFF2-40B4-BE49-F238E27FC236}">
+                <a16:creationId xmlns:a16="http://schemas.microsoft.com/office/drawing/2014/main" id="{97BA3EC5-4165-8B07-DB18-1D0729C37F20}"/>
+              </a:ext>
+            </a:extLst>
+          </p:cNvPr>
+          <p:cNvSpPr txBox="1"/>
+          <p:nvPr/>
+        </p:nvSpPr>
+        <p:spPr>
+          <a:xfrm>
+            <a:off x="7455988" y="1000714"/>
+            <a:ext cx="1473305" cy="3139321"/>
+          </a:xfrm>
+          <a:prstGeom prst="rect">
+            <a:avLst/>
+          </a:prstGeom>
+          <a:noFill/>
+        </p:spPr>
+        <p:txBody>
+          <a:bodyPr wrap="square" rtlCol="0">
+            <a:spAutoFit/>
+          </a:bodyPr>
+          <a:lstStyle/>
+          <a:p>
+            <a:pPr marL="180975" indent="-180975">
+              <a:buFont typeface="Arial" panose="020B0604020202020204" pitchFamily="34" charset="0"/>
+              <a:buChar char="•"/>
+            </a:pPr>
+            <a:r>
+              <a:rPr lang="de-DE" sz="1100" dirty="0"/>
+              <a:t>Code </a:t>
+            </a:r>
+            <a:r>
+              <a:rPr lang="de-DE" sz="1100" dirty="0" err="1"/>
+              <a:t>for</a:t>
+            </a:r>
+            <a:r>
+              <a:rPr lang="de-DE" sz="1100" dirty="0"/>
+              <a:t> </a:t>
+            </a:r>
+            <a:r>
+              <a:rPr lang="de-DE" sz="1100" dirty="0" err="1"/>
+              <a:t>the</a:t>
+            </a:r>
+            <a:r>
+              <a:rPr lang="de-DE" sz="1100" dirty="0"/>
+              <a:t> </a:t>
+            </a:r>
+            <a:r>
+              <a:rPr lang="de-DE" sz="1100" dirty="0" err="1"/>
+              <a:t>model</a:t>
+            </a:r>
+            <a:r>
+              <a:rPr lang="de-DE" sz="1100" dirty="0"/>
+              <a:t> and </a:t>
+            </a:r>
+            <a:r>
+              <a:rPr lang="de-DE" sz="1100" dirty="0" err="1"/>
+              <a:t>its</a:t>
+            </a:r>
+            <a:r>
+              <a:rPr lang="de-DE" sz="1100" dirty="0"/>
+              <a:t> </a:t>
+            </a:r>
+            <a:r>
+              <a:rPr lang="de-DE" sz="1100" dirty="0" err="1"/>
+              <a:t>preprocessing</a:t>
+            </a:r>
+            <a:r>
+              <a:rPr lang="de-DE" sz="1100" dirty="0"/>
+              <a:t> </a:t>
+            </a:r>
+          </a:p>
+          <a:p>
+            <a:pPr marL="180975" indent="-180975">
+              <a:buFont typeface="Arial" panose="020B0604020202020204" pitchFamily="34" charset="0"/>
+              <a:buChar char="•"/>
+            </a:pPr>
+            <a:r>
+              <a:rPr lang="de-DE" sz="1100" dirty="0"/>
+              <a:t>Hyperparameters and </a:t>
+            </a:r>
+            <a:r>
+              <a:rPr lang="de-DE" sz="1100" dirty="0" err="1"/>
+              <a:t>configuration</a:t>
+            </a:r>
+            <a:r>
+              <a:rPr lang="de-DE" sz="1100" dirty="0"/>
+              <a:t> </a:t>
+            </a:r>
+          </a:p>
+          <a:p>
+            <a:pPr marL="180975" indent="-180975">
+              <a:buFont typeface="Arial" panose="020B0604020202020204" pitchFamily="34" charset="0"/>
+              <a:buChar char="•"/>
+            </a:pPr>
+            <a:r>
+              <a:rPr lang="de-DE" sz="1100" dirty="0"/>
+              <a:t>Training and </a:t>
+            </a:r>
+            <a:r>
+              <a:rPr lang="de-DE" sz="1100" dirty="0" err="1"/>
+              <a:t>validation</a:t>
+            </a:r>
+            <a:r>
+              <a:rPr lang="de-DE" sz="1100" dirty="0"/>
+              <a:t> </a:t>
+            </a:r>
+            <a:r>
+              <a:rPr lang="de-DE" sz="1100" dirty="0" err="1"/>
+              <a:t>data</a:t>
+            </a:r>
+            <a:r>
+              <a:rPr lang="de-DE" sz="1100" dirty="0"/>
+              <a:t> </a:t>
+            </a:r>
+          </a:p>
+          <a:p>
+            <a:pPr marL="180975" indent="-180975">
+              <a:buFont typeface="Arial" panose="020B0604020202020204" pitchFamily="34" charset="0"/>
+              <a:buChar char="•"/>
+            </a:pPr>
+            <a:r>
+              <a:rPr lang="de-DE" sz="1100" dirty="0" err="1"/>
+              <a:t>Trained</a:t>
+            </a:r>
+            <a:r>
+              <a:rPr lang="de-DE" sz="1100" dirty="0"/>
+              <a:t> </a:t>
+            </a:r>
+            <a:r>
+              <a:rPr lang="de-DE" sz="1100" dirty="0" err="1"/>
+              <a:t>model</a:t>
+            </a:r>
+            <a:r>
+              <a:rPr lang="de-DE" sz="1100" dirty="0"/>
+              <a:t> in </a:t>
+            </a:r>
+            <a:r>
+              <a:rPr lang="de-DE" sz="1100" dirty="0" err="1"/>
+              <a:t>its</a:t>
+            </a:r>
+            <a:r>
+              <a:rPr lang="de-DE" sz="1100" dirty="0"/>
+              <a:t> </a:t>
+            </a:r>
+            <a:r>
+              <a:rPr lang="de-DE" sz="1100" dirty="0" err="1"/>
+              <a:t>runnable</a:t>
+            </a:r>
+            <a:r>
+              <a:rPr lang="de-DE" sz="1100" dirty="0"/>
+              <a:t> form </a:t>
+            </a:r>
+          </a:p>
+          <a:p>
+            <a:pPr marL="180975" indent="-180975">
+              <a:buFont typeface="Arial" panose="020B0604020202020204" pitchFamily="34" charset="0"/>
+              <a:buChar char="•"/>
+            </a:pPr>
+            <a:r>
+              <a:rPr lang="de-DE" sz="1100" dirty="0"/>
+              <a:t>An </a:t>
+            </a:r>
+            <a:r>
+              <a:rPr lang="de-DE" sz="1100" dirty="0" err="1"/>
+              <a:t>environment</a:t>
+            </a:r>
+            <a:r>
+              <a:rPr lang="de-DE" sz="1100" dirty="0"/>
+              <a:t> </a:t>
+            </a:r>
+            <a:r>
+              <a:rPr lang="de-DE" sz="1100" dirty="0" err="1"/>
+              <a:t>including</a:t>
+            </a:r>
+            <a:r>
+              <a:rPr lang="de-DE" sz="1100" dirty="0"/>
+              <a:t> </a:t>
+            </a:r>
+            <a:r>
+              <a:rPr lang="de-DE" sz="1100" dirty="0" err="1"/>
+              <a:t>libraries</a:t>
+            </a:r>
+            <a:r>
+              <a:rPr lang="de-DE" sz="1100" dirty="0"/>
+              <a:t> </a:t>
+            </a:r>
+            <a:r>
+              <a:rPr lang="de-DE" sz="1100" dirty="0" err="1"/>
+              <a:t>with</a:t>
+            </a:r>
+            <a:r>
+              <a:rPr lang="de-DE" sz="1100" dirty="0"/>
+              <a:t> </a:t>
+            </a:r>
+            <a:r>
+              <a:rPr lang="de-DE" sz="1100" dirty="0" err="1"/>
+              <a:t>specific</a:t>
+            </a:r>
+            <a:r>
+              <a:rPr lang="de-DE" sz="1100" dirty="0"/>
+              <a:t> </a:t>
+            </a:r>
+            <a:r>
+              <a:rPr lang="de-DE" sz="1100" dirty="0" err="1"/>
+              <a:t>versions</a:t>
+            </a:r>
+            <a:r>
+              <a:rPr lang="de-DE" sz="1100" dirty="0"/>
+              <a:t>, </a:t>
+            </a:r>
+            <a:r>
+              <a:rPr lang="de-DE" sz="1100" dirty="0" err="1"/>
+              <a:t>environment</a:t>
+            </a:r>
+            <a:r>
+              <a:rPr lang="de-DE" sz="1100" dirty="0"/>
+              <a:t> </a:t>
+            </a:r>
+            <a:r>
+              <a:rPr lang="de-DE" sz="1100" dirty="0" err="1"/>
+              <a:t>vari</a:t>
+            </a:r>
+            <a:r>
+              <a:rPr lang="de-DE" sz="1100" dirty="0"/>
+              <a:t>‐ </a:t>
+            </a:r>
+            <a:r>
+              <a:rPr lang="de-DE" sz="1100" dirty="0" err="1"/>
+              <a:t>ables</a:t>
+            </a:r>
+            <a:r>
+              <a:rPr lang="de-DE" sz="1100" dirty="0"/>
+              <a:t>, etc. </a:t>
+            </a:r>
+          </a:p>
+          <a:p>
+            <a:pPr marL="180975" indent="-180975">
+              <a:buFont typeface="Arial" panose="020B0604020202020204" pitchFamily="34" charset="0"/>
+              <a:buChar char="•"/>
+            </a:pPr>
+            <a:r>
+              <a:rPr lang="de-DE" sz="1100" dirty="0" err="1"/>
+              <a:t>Documentation</a:t>
+            </a:r>
+            <a:r>
+              <a:rPr lang="de-DE" sz="1100" dirty="0"/>
+              <a:t> </a:t>
+            </a:r>
+          </a:p>
+          <a:p>
+            <a:pPr marL="180975" indent="-180975">
+              <a:buFont typeface="Arial" panose="020B0604020202020204" pitchFamily="34" charset="0"/>
+              <a:buChar char="•"/>
+            </a:pPr>
+            <a:r>
+              <a:rPr lang="de-DE" sz="1100" dirty="0"/>
+              <a:t>Code and </a:t>
+            </a:r>
+            <a:r>
+              <a:rPr lang="de-DE" sz="1100" dirty="0" err="1"/>
+              <a:t>data</a:t>
+            </a:r>
+            <a:r>
+              <a:rPr lang="de-DE" sz="1100" dirty="0"/>
+              <a:t> </a:t>
+            </a:r>
+            <a:r>
+              <a:rPr lang="de-DE" sz="1100" dirty="0" err="1"/>
+              <a:t>for</a:t>
+            </a:r>
+            <a:r>
+              <a:rPr lang="de-DE" sz="1100" dirty="0"/>
+              <a:t> </a:t>
+            </a:r>
+            <a:r>
+              <a:rPr lang="de-DE" sz="1100" dirty="0" err="1"/>
+              <a:t>testing</a:t>
+            </a:r>
+            <a:r>
+              <a:rPr lang="de-DE" sz="1100" dirty="0"/>
+              <a:t> </a:t>
+            </a:r>
+            <a:r>
+              <a:rPr lang="de-DE" sz="1100" dirty="0" err="1"/>
+              <a:t>scenarios</a:t>
+            </a:r>
+            <a:r>
+              <a:rPr lang="de-DE" sz="1100" dirty="0"/>
+              <a:t> </a:t>
+            </a:r>
+          </a:p>
+        </p:txBody>
+      </p:sp>
+      <p:sp>
+        <p:nvSpPr>
+          <p:cNvPr id="41" name="Textfeld 40">
+            <a:extLst>
+              <a:ext uri="{FF2B5EF4-FFF2-40B4-BE49-F238E27FC236}">
+                <a16:creationId xmlns:a16="http://schemas.microsoft.com/office/drawing/2014/main" id="{4E56ADB2-4B91-DC7E-6856-62BBAE4B489A}"/>
+              </a:ext>
+            </a:extLst>
+          </p:cNvPr>
+          <p:cNvSpPr txBox="1"/>
+          <p:nvPr/>
+        </p:nvSpPr>
+        <p:spPr>
+          <a:xfrm>
+            <a:off x="2929109" y="4184366"/>
+            <a:ext cx="2502009" cy="261610"/>
+          </a:xfrm>
+          <a:prstGeom prst="rect">
+            <a:avLst/>
+          </a:prstGeom>
+          <a:noFill/>
+          <a:ln>
+            <a:solidFill>
+              <a:schemeClr val="tx1"/>
+            </a:solidFill>
+          </a:ln>
+        </p:spPr>
+        <p:txBody>
+          <a:bodyPr wrap="square" rtlCol="0">
+            <a:spAutoFit/>
+          </a:bodyPr>
+          <a:lstStyle/>
+          <a:p>
+            <a:pPr algn="ctr"/>
+            <a:r>
+              <a:rPr lang="de-DE" sz="1100" dirty="0"/>
+              <a:t>Model-Monitoring and Feedback Loop</a:t>
+            </a:r>
+          </a:p>
+        </p:txBody>
+      </p:sp>
+      <p:sp>
+        <p:nvSpPr>
+          <p:cNvPr id="42" name="Textfeld 41">
+            <a:extLst>
+              <a:ext uri="{FF2B5EF4-FFF2-40B4-BE49-F238E27FC236}">
+                <a16:creationId xmlns:a16="http://schemas.microsoft.com/office/drawing/2014/main" id="{E96DB83C-8450-D95C-9BF8-CBE19BEA4737}"/>
+              </a:ext>
+            </a:extLst>
+          </p:cNvPr>
+          <p:cNvSpPr txBox="1"/>
+          <p:nvPr/>
+        </p:nvSpPr>
+        <p:spPr>
+          <a:xfrm>
+            <a:off x="4435097" y="4865048"/>
+            <a:ext cx="5336431" cy="261610"/>
+          </a:xfrm>
+          <a:prstGeom prst="rect">
+            <a:avLst/>
+          </a:prstGeom>
+          <a:noFill/>
+        </p:spPr>
+        <p:txBody>
+          <a:bodyPr wrap="square" rtlCol="0">
+            <a:spAutoFit/>
+          </a:bodyPr>
+          <a:lstStyle/>
+          <a:p>
+            <a:pPr algn="ctr"/>
+            <a:r>
+              <a:rPr lang="de-DE" sz="1100" u="sng" dirty="0"/>
+              <a:t>Updated Data: Statistical Tests </a:t>
+            </a:r>
+            <a:r>
+              <a:rPr lang="de-DE" sz="1100" u="sng" dirty="0" err="1"/>
+              <a:t>is</a:t>
+            </a:r>
+            <a:r>
+              <a:rPr lang="de-DE" sz="1100" u="sng" dirty="0"/>
+              <a:t> </a:t>
+            </a:r>
+            <a:r>
+              <a:rPr lang="de-DE" sz="1100" u="sng" dirty="0" err="1"/>
+              <a:t>the</a:t>
+            </a:r>
+            <a:r>
+              <a:rPr lang="de-DE" sz="1100" u="sng" dirty="0"/>
+              <a:t> </a:t>
+            </a:r>
+            <a:r>
+              <a:rPr lang="de-DE" sz="1100" u="sng" dirty="0" err="1"/>
+              <a:t>data</a:t>
+            </a:r>
+            <a:r>
+              <a:rPr lang="de-DE" sz="1100" u="sng" dirty="0"/>
+              <a:t> </a:t>
+            </a:r>
+            <a:r>
+              <a:rPr lang="de-DE" sz="1100" u="sng" dirty="0" err="1"/>
+              <a:t>matching</a:t>
+            </a:r>
+            <a:r>
+              <a:rPr lang="de-DE" sz="1100" u="sng" dirty="0"/>
+              <a:t> </a:t>
+            </a:r>
+            <a:r>
+              <a:rPr lang="de-DE" sz="1100" u="sng" dirty="0" err="1"/>
+              <a:t>the</a:t>
+            </a:r>
+            <a:r>
+              <a:rPr lang="de-DE" sz="1100" u="sng" dirty="0"/>
+              <a:t> original </a:t>
+            </a:r>
+            <a:r>
+              <a:rPr lang="de-DE" sz="1100" u="sng" dirty="0" err="1"/>
+              <a:t>data</a:t>
+            </a:r>
+            <a:r>
+              <a:rPr lang="de-DE" sz="1100" u="sng" dirty="0"/>
+              <a:t> </a:t>
+            </a:r>
+            <a:r>
+              <a:rPr lang="de-DE" sz="1100" u="sng" dirty="0" err="1"/>
+              <a:t>distribution</a:t>
+            </a:r>
+            <a:r>
+              <a:rPr lang="de-DE" sz="1100" u="sng" dirty="0"/>
+              <a:t>?</a:t>
+            </a:r>
+          </a:p>
+        </p:txBody>
+      </p:sp>
+      <p:sp>
+        <p:nvSpPr>
+          <p:cNvPr id="43" name="Textfeld 42">
+            <a:extLst>
+              <a:ext uri="{FF2B5EF4-FFF2-40B4-BE49-F238E27FC236}">
+                <a16:creationId xmlns:a16="http://schemas.microsoft.com/office/drawing/2014/main" id="{782EB281-F154-E599-ADA9-C30A4DC9222B}"/>
+              </a:ext>
+            </a:extLst>
+          </p:cNvPr>
+          <p:cNvSpPr txBox="1"/>
+          <p:nvPr/>
+        </p:nvSpPr>
+        <p:spPr>
+          <a:xfrm>
+            <a:off x="4828497" y="5113619"/>
+            <a:ext cx="2967758" cy="600164"/>
+          </a:xfrm>
+          <a:prstGeom prst="rect">
+            <a:avLst/>
+          </a:prstGeom>
+          <a:noFill/>
+        </p:spPr>
+        <p:txBody>
+          <a:bodyPr wrap="square" rtlCol="0">
+            <a:spAutoFit/>
+          </a:bodyPr>
+          <a:lstStyle/>
+          <a:p>
+            <a:pPr marL="180975" indent="-180975">
+              <a:buFont typeface="Arial" panose="020B0604020202020204" pitchFamily="34" charset="0"/>
+              <a:buChar char="•"/>
+            </a:pPr>
+            <a:r>
+              <a:rPr lang="de-DE" sz="1100" dirty="0" err="1"/>
+              <a:t>Continous</a:t>
+            </a:r>
+            <a:r>
+              <a:rPr lang="de-DE" sz="1100" dirty="0"/>
+              <a:t> variables: Kolmogorov-Smirnov</a:t>
+            </a:r>
+          </a:p>
+          <a:p>
+            <a:pPr marL="180975" indent="-180975">
+              <a:buFont typeface="Arial" panose="020B0604020202020204" pitchFamily="34" charset="0"/>
+              <a:buChar char="•"/>
+            </a:pPr>
+            <a:r>
+              <a:rPr lang="de-DE" sz="1100" dirty="0" err="1"/>
+              <a:t>Discrete</a:t>
+            </a:r>
+            <a:r>
+              <a:rPr lang="de-DE" sz="1100" dirty="0"/>
+              <a:t> variables: Chi-Square Test</a:t>
+            </a:r>
+          </a:p>
+          <a:p>
+            <a:pPr marL="180975" indent="-180975">
+              <a:buFont typeface="Arial" panose="020B0604020202020204" pitchFamily="34" charset="0"/>
+              <a:buChar char="•"/>
+            </a:pPr>
+            <a:r>
+              <a:rPr lang="de-DE" sz="1100" dirty="0"/>
+              <a:t>Domain </a:t>
+            </a:r>
+            <a:r>
+              <a:rPr lang="de-DE" sz="1100" dirty="0" err="1"/>
+              <a:t>Classifiers</a:t>
+            </a:r>
+            <a:endParaRPr lang="de-DE" sz="1100" dirty="0"/>
+          </a:p>
+        </p:txBody>
+      </p:sp>
+      <p:cxnSp>
+        <p:nvCxnSpPr>
+          <p:cNvPr id="44" name="Gerade Verbindung mit Pfeil 43">
+            <a:extLst>
+              <a:ext uri="{FF2B5EF4-FFF2-40B4-BE49-F238E27FC236}">
+                <a16:creationId xmlns:a16="http://schemas.microsoft.com/office/drawing/2014/main" id="{D59F8670-32EC-B3B1-D9BB-10FAC720953D}"/>
+              </a:ext>
+            </a:extLst>
+          </p:cNvPr>
+          <p:cNvCxnSpPr>
+            <a:cxnSpLocks/>
+            <a:stCxn id="8" idx="2"/>
+            <a:endCxn id="41" idx="0"/>
+          </p:cNvCxnSpPr>
+          <p:nvPr/>
+        </p:nvCxnSpPr>
+        <p:spPr>
+          <a:xfrm>
+            <a:off x="4180114" y="3448662"/>
+            <a:ext cx="0" cy="735704"/>
+          </a:xfrm>
+          <a:prstGeom prst="straightConnector1">
+            <a:avLst/>
+          </a:prstGeom>
+          <a:ln>
+            <a:tailEnd type="triangle"/>
+          </a:ln>
+        </p:spPr>
+        <p:style>
+          <a:lnRef idx="1">
+            <a:schemeClr val="dk1"/>
+          </a:lnRef>
+          <a:fillRef idx="0">
+            <a:schemeClr val="dk1"/>
+          </a:fillRef>
+          <a:effectRef idx="0">
+            <a:schemeClr val="dk1"/>
+          </a:effectRef>
+          <a:fontRef idx="minor">
+            <a:schemeClr val="tx1"/>
+          </a:fontRef>
+        </p:style>
+      </p:cxnSp>
+      <p:sp>
+        <p:nvSpPr>
+          <p:cNvPr id="47" name="Geschweifte Klammer rechts 46">
+            <a:extLst>
+              <a:ext uri="{FF2B5EF4-FFF2-40B4-BE49-F238E27FC236}">
+                <a16:creationId xmlns:a16="http://schemas.microsoft.com/office/drawing/2014/main" id="{BB6DD6F7-A74C-BA32-3542-A30A0F16635C}"/>
+              </a:ext>
+            </a:extLst>
+          </p:cNvPr>
+          <p:cNvSpPr/>
+          <p:nvPr/>
+        </p:nvSpPr>
+        <p:spPr>
+          <a:xfrm rot="5400000">
+            <a:off x="3940561" y="1237376"/>
+            <a:ext cx="511628" cy="3318047"/>
+          </a:xfrm>
+          <a:prstGeom prst="rightBrace">
+            <a:avLst/>
+          </a:prstGeom>
+          <a:ln w="19050"/>
+        </p:spPr>
+        <p:style>
+          <a:lnRef idx="1">
+            <a:schemeClr val="dk1"/>
+          </a:lnRef>
+          <a:fillRef idx="0">
+            <a:schemeClr val="dk1"/>
+          </a:fillRef>
+          <a:effectRef idx="0">
+            <a:schemeClr val="dk1"/>
+          </a:effectRef>
+          <a:fontRef idx="minor">
+            <a:schemeClr val="tx1"/>
+          </a:fontRef>
+        </p:style>
+        <p:txBody>
+          <a:bodyPr rtlCol="0" anchor="ctr"/>
+          <a:lstStyle/>
+          <a:p>
+            <a:pPr algn="ctr"/>
+            <a:endParaRPr lang="de-DE" sz="1100"/>
+          </a:p>
+        </p:txBody>
+      </p:sp>
+      <p:sp>
+        <p:nvSpPr>
+          <p:cNvPr id="50" name="Textfeld 49">
+            <a:extLst>
+              <a:ext uri="{FF2B5EF4-FFF2-40B4-BE49-F238E27FC236}">
+                <a16:creationId xmlns:a16="http://schemas.microsoft.com/office/drawing/2014/main" id="{FA82E881-AA83-7150-E7FB-824F1F41D4C4}"/>
+              </a:ext>
+            </a:extLst>
+          </p:cNvPr>
+          <p:cNvSpPr txBox="1"/>
+          <p:nvPr/>
+        </p:nvSpPr>
+        <p:spPr>
+          <a:xfrm>
+            <a:off x="4116083" y="4517171"/>
+            <a:ext cx="1741115" cy="261610"/>
+          </a:xfrm>
+          <a:prstGeom prst="rect">
+            <a:avLst/>
+          </a:prstGeom>
+          <a:noFill/>
+        </p:spPr>
+        <p:txBody>
+          <a:bodyPr wrap="square" rtlCol="0">
+            <a:spAutoFit/>
+          </a:bodyPr>
+          <a:lstStyle/>
+          <a:p>
+            <a:pPr algn="ctr"/>
+            <a:r>
+              <a:rPr lang="de-DE" sz="1100" u="sng" dirty="0"/>
+              <a:t>Feature Drift</a:t>
+            </a:r>
+          </a:p>
+        </p:txBody>
+      </p:sp>
+      <p:sp>
+        <p:nvSpPr>
+          <p:cNvPr id="51" name="Textfeld 50">
+            <a:extLst>
+              <a:ext uri="{FF2B5EF4-FFF2-40B4-BE49-F238E27FC236}">
+                <a16:creationId xmlns:a16="http://schemas.microsoft.com/office/drawing/2014/main" id="{A33A35D2-7231-D363-E14D-4785CEA4543C}"/>
+              </a:ext>
+            </a:extLst>
+          </p:cNvPr>
+          <p:cNvSpPr txBox="1"/>
+          <p:nvPr/>
+        </p:nvSpPr>
+        <p:spPr>
+          <a:xfrm>
+            <a:off x="2554825" y="4555236"/>
+            <a:ext cx="1741115" cy="261610"/>
+          </a:xfrm>
+          <a:prstGeom prst="rect">
+            <a:avLst/>
+          </a:prstGeom>
+          <a:noFill/>
+        </p:spPr>
+        <p:txBody>
+          <a:bodyPr wrap="square" rtlCol="0">
+            <a:spAutoFit/>
+          </a:bodyPr>
+          <a:lstStyle/>
+          <a:p>
+            <a:pPr algn="ctr"/>
+            <a:r>
+              <a:rPr lang="de-DE" sz="1100" u="sng" dirty="0"/>
+              <a:t>Ground Truth</a:t>
+            </a:r>
+          </a:p>
+        </p:txBody>
+      </p:sp>
+      <p:sp>
+        <p:nvSpPr>
+          <p:cNvPr id="52" name="Textfeld 51">
+            <a:extLst>
+              <a:ext uri="{FF2B5EF4-FFF2-40B4-BE49-F238E27FC236}">
+                <a16:creationId xmlns:a16="http://schemas.microsoft.com/office/drawing/2014/main" id="{21A47A3A-B771-1863-CF3E-ECE8DB4BD160}"/>
+              </a:ext>
+            </a:extLst>
+          </p:cNvPr>
+          <p:cNvSpPr txBox="1"/>
+          <p:nvPr/>
+        </p:nvSpPr>
+        <p:spPr>
+          <a:xfrm>
+            <a:off x="10173934" y="4875648"/>
+            <a:ext cx="1431247" cy="261610"/>
+          </a:xfrm>
+          <a:prstGeom prst="rect">
+            <a:avLst/>
+          </a:prstGeom>
+          <a:noFill/>
+          <a:ln>
+            <a:solidFill>
+              <a:schemeClr val="tx1"/>
+            </a:solidFill>
+          </a:ln>
+        </p:spPr>
+        <p:txBody>
+          <a:bodyPr wrap="square" rtlCol="0">
+            <a:spAutoFit/>
+          </a:bodyPr>
+          <a:lstStyle/>
+          <a:p>
+            <a:pPr algn="ctr"/>
+            <a:r>
+              <a:rPr lang="de-DE" sz="1100" dirty="0"/>
+              <a:t>Model-</a:t>
+            </a:r>
+            <a:r>
+              <a:rPr lang="de-DE" sz="1100" dirty="0" err="1"/>
+              <a:t>Logging</a:t>
+            </a:r>
+            <a:endParaRPr lang="de-DE" sz="1100" dirty="0"/>
+          </a:p>
+        </p:txBody>
+      </p:sp>
+      <p:sp>
+        <p:nvSpPr>
+          <p:cNvPr id="53" name="Textfeld 52">
+            <a:extLst>
+              <a:ext uri="{FF2B5EF4-FFF2-40B4-BE49-F238E27FC236}">
+                <a16:creationId xmlns:a16="http://schemas.microsoft.com/office/drawing/2014/main" id="{767E9BD2-B195-9E25-D7A4-CB9B804F2489}"/>
+              </a:ext>
+            </a:extLst>
+          </p:cNvPr>
+          <p:cNvSpPr txBox="1"/>
+          <p:nvPr/>
+        </p:nvSpPr>
+        <p:spPr>
+          <a:xfrm>
+            <a:off x="10325013" y="5161242"/>
+            <a:ext cx="1280168" cy="1277273"/>
+          </a:xfrm>
+          <a:prstGeom prst="rect">
+            <a:avLst/>
+          </a:prstGeom>
+          <a:noFill/>
+        </p:spPr>
+        <p:txBody>
+          <a:bodyPr wrap="square" rtlCol="0">
+            <a:spAutoFit/>
+          </a:bodyPr>
+          <a:lstStyle/>
+          <a:p>
+            <a:pPr marL="180975" indent="-180975">
+              <a:buFont typeface="Arial" panose="020B0604020202020204" pitchFamily="34" charset="0"/>
+              <a:buChar char="•"/>
+            </a:pPr>
+            <a:r>
+              <a:rPr lang="de-DE" sz="1100" dirty="0"/>
+              <a:t>Model </a:t>
+            </a:r>
+            <a:r>
+              <a:rPr lang="de-DE" sz="1100" dirty="0" err="1"/>
+              <a:t>metadata</a:t>
+            </a:r>
+            <a:endParaRPr lang="de-DE" sz="1100" dirty="0"/>
+          </a:p>
+          <a:p>
+            <a:pPr marL="180975" indent="-180975">
+              <a:buFont typeface="Arial" panose="020B0604020202020204" pitchFamily="34" charset="0"/>
+              <a:buChar char="•"/>
+            </a:pPr>
+            <a:r>
+              <a:rPr lang="de-DE" sz="1100" dirty="0"/>
+              <a:t>Model </a:t>
+            </a:r>
+            <a:r>
+              <a:rPr lang="de-DE" sz="1100" dirty="0" err="1"/>
+              <a:t>inputs</a:t>
+            </a:r>
+            <a:endParaRPr lang="de-DE" sz="1100" dirty="0"/>
+          </a:p>
+          <a:p>
+            <a:pPr marL="180975" indent="-180975">
+              <a:buFont typeface="Arial" panose="020B0604020202020204" pitchFamily="34" charset="0"/>
+              <a:buChar char="•"/>
+            </a:pPr>
+            <a:r>
+              <a:rPr lang="de-DE" sz="1100" dirty="0"/>
+              <a:t>Model </a:t>
+            </a:r>
+            <a:r>
+              <a:rPr lang="de-DE" sz="1100" dirty="0" err="1"/>
+              <a:t>outputs</a:t>
+            </a:r>
+            <a:endParaRPr lang="de-DE" sz="1100" dirty="0"/>
+          </a:p>
+          <a:p>
+            <a:pPr marL="180975" indent="-180975">
+              <a:buFont typeface="Arial" panose="020B0604020202020204" pitchFamily="34" charset="0"/>
+              <a:buChar char="•"/>
+            </a:pPr>
+            <a:r>
+              <a:rPr lang="de-DE" sz="1100" dirty="0"/>
+              <a:t>System </a:t>
+            </a:r>
+            <a:r>
+              <a:rPr lang="de-DE" sz="1100" dirty="0" err="1"/>
+              <a:t>action</a:t>
+            </a:r>
+            <a:endParaRPr lang="de-DE" sz="1100" dirty="0"/>
+          </a:p>
+          <a:p>
+            <a:pPr marL="180975" indent="-180975">
+              <a:buFont typeface="Arial" panose="020B0604020202020204" pitchFamily="34" charset="0"/>
+              <a:buChar char="•"/>
+            </a:pPr>
+            <a:r>
+              <a:rPr lang="de-DE" sz="1100" dirty="0"/>
+              <a:t>Model </a:t>
+            </a:r>
+            <a:r>
+              <a:rPr lang="de-DE" sz="1100" dirty="0" err="1"/>
+              <a:t>explanation</a:t>
+            </a:r>
+            <a:endParaRPr lang="de-DE" sz="1100" dirty="0"/>
+          </a:p>
+        </p:txBody>
+      </p:sp>
+      <p:sp>
+        <p:nvSpPr>
+          <p:cNvPr id="54" name="Textfeld 53">
+            <a:extLst>
+              <a:ext uri="{FF2B5EF4-FFF2-40B4-BE49-F238E27FC236}">
+                <a16:creationId xmlns:a16="http://schemas.microsoft.com/office/drawing/2014/main" id="{3AF2796B-7617-F94F-D74A-24D4BD12E573}"/>
+              </a:ext>
+            </a:extLst>
+          </p:cNvPr>
+          <p:cNvSpPr txBox="1"/>
+          <p:nvPr/>
+        </p:nvSpPr>
+        <p:spPr>
+          <a:xfrm>
+            <a:off x="4116083" y="6038060"/>
+            <a:ext cx="1741115" cy="261610"/>
+          </a:xfrm>
+          <a:prstGeom prst="rect">
+            <a:avLst/>
+          </a:prstGeom>
+          <a:noFill/>
+        </p:spPr>
+        <p:txBody>
+          <a:bodyPr wrap="square" rtlCol="0">
+            <a:spAutoFit/>
+          </a:bodyPr>
+          <a:lstStyle/>
+          <a:p>
+            <a:pPr algn="ctr"/>
+            <a:r>
+              <a:rPr lang="de-DE" sz="1100" u="sng" dirty="0"/>
+              <a:t>A/B </a:t>
+            </a:r>
+            <a:r>
+              <a:rPr lang="de-DE" sz="1100" u="sng" dirty="0" err="1"/>
+              <a:t>Testing</a:t>
+            </a:r>
+            <a:endParaRPr lang="de-DE" sz="1100" u="sng" dirty="0"/>
+          </a:p>
+        </p:txBody>
+      </p:sp>
+      <p:sp>
+        <p:nvSpPr>
+          <p:cNvPr id="55" name="Textfeld 54">
+            <a:extLst>
+              <a:ext uri="{FF2B5EF4-FFF2-40B4-BE49-F238E27FC236}">
+                <a16:creationId xmlns:a16="http://schemas.microsoft.com/office/drawing/2014/main" id="{C3D64F42-EF83-911A-F7FD-D3BD0F77C4FB}"/>
+              </a:ext>
+            </a:extLst>
+          </p:cNvPr>
+          <p:cNvSpPr txBox="1"/>
+          <p:nvPr/>
+        </p:nvSpPr>
+        <p:spPr>
+          <a:xfrm>
+            <a:off x="2554825" y="6076125"/>
+            <a:ext cx="1741115" cy="261610"/>
+          </a:xfrm>
+          <a:prstGeom prst="rect">
+            <a:avLst/>
+          </a:prstGeom>
+          <a:noFill/>
+        </p:spPr>
+        <p:txBody>
+          <a:bodyPr wrap="square" rtlCol="0">
+            <a:spAutoFit/>
+          </a:bodyPr>
+          <a:lstStyle/>
+          <a:p>
+            <a:pPr algn="ctr"/>
+            <a:r>
+              <a:rPr lang="de-DE" sz="1100" u="sng" dirty="0"/>
+              <a:t>Challenger/Champion</a:t>
+            </a:r>
           </a:p>
         </p:txBody>
       </p:sp>
@@ -15433,6 +18295,66 @@
     <p:extLst>
       <p:ext uri="{BB962C8B-B14F-4D97-AF65-F5344CB8AC3E}">
         <p14:creationId xmlns:p14="http://schemas.microsoft.com/office/powerpoint/2010/main" val="2848616653"/>
+      </p:ext>
+    </p:extLst>
+  </p:cSld>
+  <p:clrMapOvr>
+    <a:masterClrMapping/>
+  </p:clrMapOvr>
+</p:sld>
+</file>
+
+<file path=ppt/slides/slide5.xml><?xml version="1.0" encoding="utf-8"?>
+<p:sld xmlns:a="http://schemas.openxmlformats.org/drawingml/2006/main" xmlns:r="http://schemas.openxmlformats.org/officeDocument/2006/relationships" xmlns:p="http://schemas.openxmlformats.org/presentationml/2006/main">
+  <p:cSld>
+    <p:spTree>
+      <p:nvGrpSpPr>
+        <p:cNvPr id="1" name=""/>
+        <p:cNvGrpSpPr/>
+        <p:nvPr/>
+      </p:nvGrpSpPr>
+      <p:grpSpPr>
+        <a:xfrm>
+          <a:off x="0" y="0"/>
+          <a:ext cx="0" cy="0"/>
+          <a:chOff x="0" y="0"/>
+          <a:chExt cx="0" cy="0"/>
+        </a:xfrm>
+      </p:grpSpPr>
+      <p:pic>
+        <p:nvPicPr>
+          <p:cNvPr id="4" name="Grafik 3">
+            <a:extLst>
+              <a:ext uri="{FF2B5EF4-FFF2-40B4-BE49-F238E27FC236}">
+                <a16:creationId xmlns:a16="http://schemas.microsoft.com/office/drawing/2014/main" id="{9D7BCA6A-8C19-F472-16DB-CB58494C9523}"/>
+              </a:ext>
+            </a:extLst>
+          </p:cNvPr>
+          <p:cNvPicPr>
+            <a:picLocks noChangeAspect="1"/>
+          </p:cNvPicPr>
+          <p:nvPr/>
+        </p:nvPicPr>
+        <p:blipFill>
+          <a:blip r:embed="rId2"/>
+          <a:stretch>
+            <a:fillRect/>
+          </a:stretch>
+        </p:blipFill>
+        <p:spPr>
+          <a:xfrm>
+            <a:off x="2209800" y="1126983"/>
+            <a:ext cx="7772400" cy="4604033"/>
+          </a:xfrm>
+          <a:prstGeom prst="rect">
+            <a:avLst/>
+          </a:prstGeom>
+        </p:spPr>
+      </p:pic>
+    </p:spTree>
+    <p:extLst>
+      <p:ext uri="{BB962C8B-B14F-4D97-AF65-F5344CB8AC3E}">
+        <p14:creationId xmlns:p14="http://schemas.microsoft.com/office/powerpoint/2010/main" val="3422507600"/>
       </p:ext>
     </p:extLst>
   </p:cSld>

</xml_diff>